<commit_message>
Puts a fork in it
all that remains is cleanup of the code and commentary for the general populous. Also, more explanation of the processes and decision making
</commit_message>
<xml_diff>
--- a/biodiversity_presentation.pptx
+++ b/biodiversity_presentation.pptx
@@ -5,7 +5,7 @@
     <p:sldMasterId id="2147483660" r:id="rId1"/>
   </p:sldMasterIdLst>
   <p:notesMasterIdLst>
-    <p:notesMasterId r:id="rId13"/>
+    <p:notesMasterId r:id="rId17"/>
   </p:notesMasterIdLst>
   <p:sldIdLst>
     <p:sldId id="256" r:id="rId2"/>
@@ -16,9 +16,13 @@
     <p:sldId id="259" r:id="rId7"/>
     <p:sldId id="264" r:id="rId8"/>
     <p:sldId id="265" r:id="rId9"/>
-    <p:sldId id="266" r:id="rId10"/>
-    <p:sldId id="268" r:id="rId11"/>
+    <p:sldId id="268" r:id="rId10"/>
+    <p:sldId id="269" r:id="rId11"/>
     <p:sldId id="267" r:id="rId12"/>
+    <p:sldId id="270" r:id="rId13"/>
+    <p:sldId id="271" r:id="rId14"/>
+    <p:sldId id="273" r:id="rId15"/>
+    <p:sldId id="272" r:id="rId16"/>
   </p:sldIdLst>
   <p:sldSz cx="12192000" cy="6858000"/>
   <p:notesSz cx="6858000" cy="9144000"/>
@@ -128,7 +132,7 @@
 <file path=ppt/revisionInfo.xml><?xml version="1.0" encoding="utf-8"?>
 <p1510:revInfo xmlns:a="http://schemas.openxmlformats.org/drawingml/2006/main" xmlns:r="http://schemas.openxmlformats.org/officeDocument/2006/relationships" xmlns:p1510="http://schemas.microsoft.com/office/powerpoint/2015/10/main">
   <p1510:revLst>
-    <p1510:client id="{0A2BC17E-C437-480D-BCC0-092F67052ED0}" v="26" dt="2025-01-15T02:43:21.081"/>
+    <p1510:client id="{0A2BC17E-C437-480D-BCC0-092F67052ED0}" v="50" dt="2025-01-17T00:21:22.239"/>
   </p1510:revLst>
 </p1510:revInfo>
 </file>
@@ -138,7 +142,7 @@
   <pc:docChgLst>
     <pc:chgData name="David A. Gee" userId="e9ce1845d50193f0" providerId="LiveId" clId="{0A2BC17E-C437-480D-BCC0-092F67052ED0}"/>
     <pc:docChg chg="undo custSel addSld delSld modSld sldOrd">
-      <pc:chgData name="David A. Gee" userId="e9ce1845d50193f0" providerId="LiveId" clId="{0A2BC17E-C437-480D-BCC0-092F67052ED0}" dt="2025-01-15T02:48:54.548" v="8182" actId="20577"/>
+      <pc:chgData name="David A. Gee" userId="e9ce1845d50193f0" providerId="LiveId" clId="{0A2BC17E-C437-480D-BCC0-092F67052ED0}" dt="2025-01-17T00:39:01.457" v="11044" actId="20577"/>
       <pc:docMkLst>
         <pc:docMk/>
       </pc:docMkLst>
@@ -248,54 +252,6 @@
           <pc:docMk/>
           <pc:sldMk cId="423317110" sldId="260"/>
         </pc:sldMkLst>
-        <pc:spChg chg="del">
-          <ac:chgData name="David A. Gee" userId="e9ce1845d50193f0" providerId="LiveId" clId="{0A2BC17E-C437-480D-BCC0-092F67052ED0}" dt="2025-01-15T01:28:10.237" v="3589" actId="478"/>
-          <ac:spMkLst>
-            <pc:docMk/>
-            <pc:sldMk cId="423317110" sldId="260"/>
-            <ac:spMk id="2" creationId="{469EC11D-F59B-8B03-D38E-362F36749189}"/>
-          </ac:spMkLst>
-        </pc:spChg>
-        <pc:spChg chg="del">
-          <ac:chgData name="David A. Gee" userId="e9ce1845d50193f0" providerId="LiveId" clId="{0A2BC17E-C437-480D-BCC0-092F67052ED0}" dt="2025-01-15T01:26:40.179" v="3581"/>
-          <ac:spMkLst>
-            <pc:docMk/>
-            <pc:sldMk cId="423317110" sldId="260"/>
-            <ac:spMk id="3" creationId="{8103486D-091C-FE1B-B379-B4D02605134F}"/>
-          </ac:spMkLst>
-        </pc:spChg>
-        <pc:spChg chg="add del mod">
-          <ac:chgData name="David A. Gee" userId="e9ce1845d50193f0" providerId="LiveId" clId="{0A2BC17E-C437-480D-BCC0-092F67052ED0}" dt="2025-01-15T01:27:51.902" v="3586"/>
-          <ac:spMkLst>
-            <pc:docMk/>
-            <pc:sldMk cId="423317110" sldId="260"/>
-            <ac:spMk id="7" creationId="{2BB559E0-F6AF-7298-15C7-8EB83372D95D}"/>
-          </ac:spMkLst>
-        </pc:spChg>
-        <pc:spChg chg="add mod">
-          <ac:chgData name="David A. Gee" userId="e9ce1845d50193f0" providerId="LiveId" clId="{0A2BC17E-C437-480D-BCC0-092F67052ED0}" dt="2025-01-15T02:33:21.477" v="5924" actId="21"/>
-          <ac:spMkLst>
-            <pc:docMk/>
-            <pc:sldMk cId="423317110" sldId="260"/>
-            <ac:spMk id="11" creationId="{E6260553-60D1-A849-06EC-E116BA3D26BC}"/>
-          </ac:spMkLst>
-        </pc:spChg>
-        <pc:picChg chg="add del mod">
-          <ac:chgData name="David A. Gee" userId="e9ce1845d50193f0" providerId="LiveId" clId="{0A2BC17E-C437-480D-BCC0-092F67052ED0}" dt="2025-01-15T01:27:50.515" v="3585" actId="478"/>
-          <ac:picMkLst>
-            <pc:docMk/>
-            <pc:sldMk cId="423317110" sldId="260"/>
-            <ac:picMk id="5" creationId="{76565C45-C088-69F8-D269-367D83B70F82}"/>
-          </ac:picMkLst>
-        </pc:picChg>
-        <pc:picChg chg="add del mod modCrop">
-          <ac:chgData name="David A. Gee" userId="e9ce1845d50193f0" providerId="LiveId" clId="{0A2BC17E-C437-480D-BCC0-092F67052ED0}" dt="2025-01-15T02:33:21.477" v="5924" actId="21"/>
-          <ac:picMkLst>
-            <pc:docMk/>
-            <pc:sldMk cId="423317110" sldId="260"/>
-            <ac:picMk id="9" creationId="{D47F2644-EFEF-BBAA-ABFF-6BC97D32A429}"/>
-          </ac:picMkLst>
-        </pc:picChg>
       </pc:sldChg>
       <pc:sldChg chg="addSp delSp modSp new del mod ord">
         <pc:chgData name="David A. Gee" userId="e9ce1845d50193f0" providerId="LiveId" clId="{0A2BC17E-C437-480D-BCC0-092F67052ED0}" dt="2025-01-15T02:42:25.917" v="7240" actId="47"/>
@@ -303,70 +259,6 @@
           <pc:docMk/>
           <pc:sldMk cId="737488910" sldId="261"/>
         </pc:sldMkLst>
-        <pc:spChg chg="del mod">
-          <ac:chgData name="David A. Gee" userId="e9ce1845d50193f0" providerId="LiveId" clId="{0A2BC17E-C437-480D-BCC0-092F67052ED0}" dt="2025-01-15T01:51:43.464" v="4822" actId="478"/>
-          <ac:spMkLst>
-            <pc:docMk/>
-            <pc:sldMk cId="737488910" sldId="261"/>
-            <ac:spMk id="2" creationId="{7FFBFE25-390B-AF73-3429-AD8224719E74}"/>
-          </ac:spMkLst>
-        </pc:spChg>
-        <pc:spChg chg="del mod">
-          <ac:chgData name="David A. Gee" userId="e9ce1845d50193f0" providerId="LiveId" clId="{0A2BC17E-C437-480D-BCC0-092F67052ED0}" dt="2025-01-15T01:48:39.828" v="4815"/>
-          <ac:spMkLst>
-            <pc:docMk/>
-            <pc:sldMk cId="737488910" sldId="261"/>
-            <ac:spMk id="3" creationId="{20BCE066-37D4-00EB-9943-23C2B62295CA}"/>
-          </ac:spMkLst>
-        </pc:spChg>
-        <pc:spChg chg="add del mod">
-          <ac:chgData name="David A. Gee" userId="e9ce1845d50193f0" providerId="LiveId" clId="{0A2BC17E-C437-480D-BCC0-092F67052ED0}" dt="2025-01-15T01:50:15.744" v="4819"/>
-          <ac:spMkLst>
-            <pc:docMk/>
-            <pc:sldMk cId="737488910" sldId="261"/>
-            <ac:spMk id="7" creationId="{5A1ED77B-75DD-0230-31E0-D2176078E9C0}"/>
-          </ac:spMkLst>
-        </pc:spChg>
-        <pc:spChg chg="add del mod">
-          <ac:chgData name="David A. Gee" userId="e9ce1845d50193f0" providerId="LiveId" clId="{0A2BC17E-C437-480D-BCC0-092F67052ED0}" dt="2025-01-15T01:51:39.917" v="4821"/>
-          <ac:spMkLst>
-            <pc:docMk/>
-            <pc:sldMk cId="737488910" sldId="261"/>
-            <ac:spMk id="10" creationId="{A518DC6B-A0C5-C433-D1F0-5B7B9F93763F}"/>
-          </ac:spMkLst>
-        </pc:spChg>
-        <pc:spChg chg="add mod">
-          <ac:chgData name="David A. Gee" userId="e9ce1845d50193f0" providerId="LiveId" clId="{0A2BC17E-C437-480D-BCC0-092F67052ED0}" dt="2025-01-15T02:33:27.823" v="5926" actId="21"/>
-          <ac:spMkLst>
-            <pc:docMk/>
-            <pc:sldMk cId="737488910" sldId="261"/>
-            <ac:spMk id="13" creationId="{DD21F2FB-B00D-86CA-7C49-2BCFEBFE0342}"/>
-          </ac:spMkLst>
-        </pc:spChg>
-        <pc:picChg chg="add del mod">
-          <ac:chgData name="David A. Gee" userId="e9ce1845d50193f0" providerId="LiveId" clId="{0A2BC17E-C437-480D-BCC0-092F67052ED0}" dt="2025-01-15T01:48:44.056" v="4818" actId="478"/>
-          <ac:picMkLst>
-            <pc:docMk/>
-            <pc:sldMk cId="737488910" sldId="261"/>
-            <ac:picMk id="5" creationId="{218DBDEA-1EE5-0693-C746-42E66FE08E18}"/>
-          </ac:picMkLst>
-        </pc:picChg>
-        <pc:picChg chg="add del mod">
-          <ac:chgData name="David A. Gee" userId="e9ce1845d50193f0" providerId="LiveId" clId="{0A2BC17E-C437-480D-BCC0-092F67052ED0}" dt="2025-01-15T01:51:38.133" v="4820" actId="478"/>
-          <ac:picMkLst>
-            <pc:docMk/>
-            <pc:sldMk cId="737488910" sldId="261"/>
-            <ac:picMk id="8" creationId="{2EEE09E9-4663-7986-5DC3-666F842A2ED9}"/>
-          </ac:picMkLst>
-        </pc:picChg>
-        <pc:picChg chg="add del mod modCrop">
-          <ac:chgData name="David A. Gee" userId="e9ce1845d50193f0" providerId="LiveId" clId="{0A2BC17E-C437-480D-BCC0-092F67052ED0}" dt="2025-01-15T02:33:27.823" v="5926" actId="21"/>
-          <ac:picMkLst>
-            <pc:docMk/>
-            <pc:sldMk cId="737488910" sldId="261"/>
-            <ac:picMk id="11" creationId="{DC4CB40F-01E8-153B-AFAA-530DBD61C173}"/>
-          </ac:picMkLst>
-        </pc:picChg>
       </pc:sldChg>
       <pc:sldChg chg="modSp new mod">
         <pc:chgData name="David A. Gee" userId="e9ce1845d50193f0" providerId="LiveId" clId="{0A2BC17E-C437-480D-BCC0-092F67052ED0}" dt="2025-01-15T02:18:37.917" v="4884"/>
@@ -397,70 +289,6 @@
           <pc:docMk/>
           <pc:sldMk cId="1944706376" sldId="263"/>
         </pc:sldMkLst>
-        <pc:spChg chg="del">
-          <ac:chgData name="David A. Gee" userId="e9ce1845d50193f0" providerId="LiveId" clId="{0A2BC17E-C437-480D-BCC0-092F67052ED0}" dt="2025-01-15T02:08:02.599" v="4837" actId="478"/>
-          <ac:spMkLst>
-            <pc:docMk/>
-            <pc:sldMk cId="1944706376" sldId="263"/>
-            <ac:spMk id="2" creationId="{066F2C34-D025-768A-1B0A-D9BCAF30E681}"/>
-          </ac:spMkLst>
-        </pc:spChg>
-        <pc:spChg chg="del">
-          <ac:chgData name="David A. Gee" userId="e9ce1845d50193f0" providerId="LiveId" clId="{0A2BC17E-C437-480D-BCC0-092F67052ED0}" dt="2025-01-15T02:06:31.706" v="4830"/>
-          <ac:spMkLst>
-            <pc:docMk/>
-            <pc:sldMk cId="1944706376" sldId="263"/>
-            <ac:spMk id="3" creationId="{C1DC5D61-0164-E645-7116-891FE3A28EBD}"/>
-          </ac:spMkLst>
-        </pc:spChg>
-        <pc:spChg chg="del">
-          <ac:chgData name="David A. Gee" userId="e9ce1845d50193f0" providerId="LiveId" clId="{0A2BC17E-C437-480D-BCC0-092F67052ED0}" dt="2025-01-15T02:08:08.086" v="4838"/>
-          <ac:spMkLst>
-            <pc:docMk/>
-            <pc:sldMk cId="1944706376" sldId="263"/>
-            <ac:spMk id="4" creationId="{CC03F0C3-173D-638D-B597-D164E5F30B9D}"/>
-          </ac:spMkLst>
-        </pc:spChg>
-        <pc:spChg chg="add del mod">
-          <ac:chgData name="David A. Gee" userId="e9ce1845d50193f0" providerId="LiveId" clId="{0A2BC17E-C437-480D-BCC0-092F67052ED0}" dt="2025-01-15T02:07:52.392" v="4834"/>
-          <ac:spMkLst>
-            <pc:docMk/>
-            <pc:sldMk cId="1944706376" sldId="263"/>
-            <ac:spMk id="8" creationId="{93118B1F-FD77-8AEF-6FC7-267942AA4874}"/>
-          </ac:spMkLst>
-        </pc:spChg>
-        <pc:spChg chg="add del mod">
-          <ac:chgData name="David A. Gee" userId="e9ce1845d50193f0" providerId="LiveId" clId="{0A2BC17E-C437-480D-BCC0-092F67052ED0}" dt="2025-01-15T02:14:16.345" v="4849"/>
-          <ac:spMkLst>
-            <pc:docMk/>
-            <pc:sldMk cId="1944706376" sldId="263"/>
-            <ac:spMk id="13" creationId="{05DCB8C4-B064-C50A-C187-06F2E85C9B50}"/>
-          </ac:spMkLst>
-        </pc:spChg>
-        <pc:spChg chg="add del mod">
-          <ac:chgData name="David A. Gee" userId="e9ce1845d50193f0" providerId="LiveId" clId="{0A2BC17E-C437-480D-BCC0-092F67052ED0}" dt="2025-01-15T02:16:33.126" v="4859"/>
-          <ac:spMkLst>
-            <pc:docMk/>
-            <pc:sldMk cId="1944706376" sldId="263"/>
-            <ac:spMk id="17" creationId="{4CE1021A-536E-60EA-335F-3F9000DB5464}"/>
-          </ac:spMkLst>
-        </pc:spChg>
-        <pc:spChg chg="add del mod">
-          <ac:chgData name="David A. Gee" userId="e9ce1845d50193f0" providerId="LiveId" clId="{0A2BC17E-C437-480D-BCC0-092F67052ED0}" dt="2025-01-15T02:16:46.337" v="4863"/>
-          <ac:spMkLst>
-            <pc:docMk/>
-            <pc:sldMk cId="1944706376" sldId="263"/>
-            <ac:spMk id="21" creationId="{5F8ABE1E-C834-BBA8-F92E-864335D017FB}"/>
-          </ac:spMkLst>
-        </pc:spChg>
-        <pc:spChg chg="add del mod">
-          <ac:chgData name="David A. Gee" userId="e9ce1845d50193f0" providerId="LiveId" clId="{0A2BC17E-C437-480D-BCC0-092F67052ED0}" dt="2025-01-15T02:17:49.790" v="4877" actId="478"/>
-          <ac:spMkLst>
-            <pc:docMk/>
-            <pc:sldMk cId="1944706376" sldId="263"/>
-            <ac:spMk id="24" creationId="{C0DDF836-7A32-BF8A-F7D4-F2C7D37E2BFD}"/>
-          </ac:spMkLst>
-        </pc:spChg>
         <pc:spChg chg="add del mod">
           <ac:chgData name="David A. Gee" userId="e9ce1845d50193f0" providerId="LiveId" clId="{0A2BC17E-C437-480D-BCC0-092F67052ED0}" dt="2025-01-15T02:22:30.472" v="5307" actId="20577"/>
           <ac:spMkLst>
@@ -469,100 +297,12 @@
             <ac:spMk id="28" creationId="{881C504F-94B3-BDC3-4963-AFA03B1D311E}"/>
           </ac:spMkLst>
         </pc:spChg>
-        <pc:spChg chg="add del">
-          <ac:chgData name="David A. Gee" userId="e9ce1845d50193f0" providerId="LiveId" clId="{0A2BC17E-C437-480D-BCC0-092F67052ED0}" dt="2025-01-15T02:17:46.670" v="4875" actId="26606"/>
-          <ac:spMkLst>
-            <pc:docMk/>
-            <pc:sldMk cId="1944706376" sldId="263"/>
-            <ac:spMk id="41" creationId="{7459C506-5F4B-4B75-9218-C7C3F87FA8D3}"/>
-          </ac:spMkLst>
-        </pc:spChg>
-        <pc:spChg chg="add del">
-          <ac:chgData name="David A. Gee" userId="e9ce1845d50193f0" providerId="LiveId" clId="{0A2BC17E-C437-480D-BCC0-092F67052ED0}" dt="2025-01-15T02:17:46.670" v="4875" actId="26606"/>
-          <ac:spMkLst>
-            <pc:docMk/>
-            <pc:sldMk cId="1944706376" sldId="263"/>
-            <ac:spMk id="54" creationId="{4E74DA95-CD7A-4D5E-9D27-67A759CE708D}"/>
-          </ac:spMkLst>
-        </pc:spChg>
-        <pc:spChg chg="add del">
-          <ac:chgData name="David A. Gee" userId="e9ce1845d50193f0" providerId="LiveId" clId="{0A2BC17E-C437-480D-BCC0-092F67052ED0}" dt="2025-01-15T02:18:37.917" v="4884"/>
-          <ac:spMkLst>
-            <pc:docMk/>
-            <pc:sldMk cId="1944706376" sldId="263"/>
-            <ac:spMk id="67" creationId="{8267EEE4-6354-4F1C-9484-951F0EB92F1B}"/>
-          </ac:spMkLst>
-        </pc:spChg>
-        <pc:spChg chg="add del">
-          <ac:chgData name="David A. Gee" userId="e9ce1845d50193f0" providerId="LiveId" clId="{0A2BC17E-C437-480D-BCC0-092F67052ED0}" dt="2025-01-15T02:18:37.917" v="4884"/>
-          <ac:spMkLst>
-            <pc:docMk/>
-            <pc:sldMk cId="1944706376" sldId="263"/>
-            <ac:spMk id="68" creationId="{0E5A83F9-E6B8-40BD-9C0D-9A6F15650742}"/>
-          </ac:spMkLst>
-        </pc:spChg>
-        <pc:grpChg chg="add del">
-          <ac:chgData name="David A. Gee" userId="e9ce1845d50193f0" providerId="LiveId" clId="{0A2BC17E-C437-480D-BCC0-092F67052ED0}" dt="2025-01-15T02:17:46.670" v="4875" actId="26606"/>
-          <ac:grpSpMkLst>
-            <pc:docMk/>
-            <pc:sldMk cId="1944706376" sldId="263"/>
-            <ac:grpSpMk id="29" creationId="{7664F850-BA8B-47AE-B11A-225CAB8969F1}"/>
-          </ac:grpSpMkLst>
-        </pc:grpChg>
-        <pc:grpChg chg="add del">
-          <ac:chgData name="David A. Gee" userId="e9ce1845d50193f0" providerId="LiveId" clId="{0A2BC17E-C437-480D-BCC0-092F67052ED0}" dt="2025-01-15T02:18:37.917" v="4884"/>
-          <ac:grpSpMkLst>
-            <pc:docMk/>
-            <pc:sldMk cId="1944706376" sldId="263"/>
-            <ac:grpSpMk id="31" creationId="{EB0D40EF-BA14-42F1-9492-D38C59DCAB67}"/>
-          </ac:grpSpMkLst>
-        </pc:grpChg>
-        <pc:grpChg chg="add del">
-          <ac:chgData name="David A. Gee" userId="e9ce1845d50193f0" providerId="LiveId" clId="{0A2BC17E-C437-480D-BCC0-092F67052ED0}" dt="2025-01-15T02:17:46.670" v="4875" actId="26606"/>
-          <ac:grpSpMkLst>
-            <pc:docMk/>
-            <pc:sldMk cId="1944706376" sldId="263"/>
-            <ac:grpSpMk id="43" creationId="{BC659EEB-C3AE-4544-8263-417009DCDF41}"/>
-          </ac:grpSpMkLst>
-        </pc:grpChg>
-        <pc:picChg chg="add del mod">
-          <ac:chgData name="David A. Gee" userId="e9ce1845d50193f0" providerId="LiveId" clId="{0A2BC17E-C437-480D-BCC0-092F67052ED0}" dt="2025-01-15T02:06:35.262" v="4833" actId="478"/>
-          <ac:picMkLst>
-            <pc:docMk/>
-            <pc:sldMk cId="1944706376" sldId="263"/>
-            <ac:picMk id="6" creationId="{C0B9549F-3F04-8816-3C89-32364DB8E841}"/>
-          </ac:picMkLst>
-        </pc:picChg>
-        <pc:picChg chg="add del mod modCrop">
-          <ac:chgData name="David A. Gee" userId="e9ce1845d50193f0" providerId="LiveId" clId="{0A2BC17E-C437-480D-BCC0-092F67052ED0}" dt="2025-01-15T02:14:11.274" v="4848" actId="478"/>
-          <ac:picMkLst>
-            <pc:docMk/>
-            <pc:sldMk cId="1944706376" sldId="263"/>
-            <ac:picMk id="10" creationId="{51F6080D-857B-C245-9CAB-A8C0D4DCE553}"/>
-          </ac:picMkLst>
-        </pc:picChg>
         <pc:picChg chg="add mod modCrop">
           <ac:chgData name="David A. Gee" userId="e9ce1845d50193f0" providerId="LiveId" clId="{0A2BC17E-C437-480D-BCC0-092F67052ED0}" dt="2025-01-15T02:20:34.205" v="4905" actId="1076"/>
           <ac:picMkLst>
             <pc:docMk/>
             <pc:sldMk cId="1944706376" sldId="263"/>
             <ac:picMk id="11" creationId="{D84327C7-9457-FE4D-2836-5D09C7E2C85D}"/>
-          </ac:picMkLst>
-        </pc:picChg>
-        <pc:picChg chg="add del mod modCrop">
-          <ac:chgData name="David A. Gee" userId="e9ce1845d50193f0" providerId="LiveId" clId="{0A2BC17E-C437-480D-BCC0-092F67052ED0}" dt="2025-01-15T02:16:31.458" v="4858" actId="478"/>
-          <ac:picMkLst>
-            <pc:docMk/>
-            <pc:sldMk cId="1944706376" sldId="263"/>
-            <ac:picMk id="15" creationId="{BEF9F0B4-F098-F09D-7BAF-D202C0E66596}"/>
-          </ac:picMkLst>
-        </pc:picChg>
-        <pc:picChg chg="add del mod">
-          <ac:chgData name="David A. Gee" userId="e9ce1845d50193f0" providerId="LiveId" clId="{0A2BC17E-C437-480D-BCC0-092F67052ED0}" dt="2025-01-15T02:16:39.875" v="4862" actId="478"/>
-          <ac:picMkLst>
-            <pc:docMk/>
-            <pc:sldMk cId="1944706376" sldId="263"/>
-            <ac:picMk id="19" creationId="{71AA0B5F-887E-DE56-1A5D-007F10216D9A}"/>
           </ac:picMkLst>
         </pc:picChg>
         <pc:picChg chg="add mod modCrop">
@@ -573,22 +313,6 @@
             <ac:picMk id="23" creationId="{6F796701-3BC2-3719-ABA3-E0F26DB91938}"/>
           </ac:picMkLst>
         </pc:picChg>
-        <pc:picChg chg="add del mod ord">
-          <ac:chgData name="David A. Gee" userId="e9ce1845d50193f0" providerId="LiveId" clId="{0A2BC17E-C437-480D-BCC0-092F67052ED0}" dt="2025-01-15T02:18:45.630" v="4886" actId="34307"/>
-          <ac:picMkLst>
-            <pc:docMk/>
-            <pc:sldMk cId="1944706376" sldId="263"/>
-            <ac:picMk id="25" creationId="{DEAC1C6C-1DAF-9829-3E7B-C6BCFAD4E094}"/>
-          </ac:picMkLst>
-        </pc:picChg>
-        <pc:cxnChg chg="add del">
-          <ac:chgData name="David A. Gee" userId="e9ce1845d50193f0" providerId="LiveId" clId="{0A2BC17E-C437-480D-BCC0-092F67052ED0}" dt="2025-01-15T02:17:46.670" v="4875" actId="26606"/>
-          <ac:cxnSpMkLst>
-            <pc:docMk/>
-            <pc:sldMk cId="1944706376" sldId="263"/>
-            <ac:cxnSpMk id="56" creationId="{14AA3B5C-0C55-4FFF-9C45-8F9F7C074A4E}"/>
-          </ac:cxnSpMkLst>
-        </pc:cxnChg>
       </pc:sldChg>
       <pc:sldChg chg="modSp new mod">
         <pc:chgData name="David A. Gee" userId="e9ce1845d50193f0" providerId="LiveId" clId="{0A2BC17E-C437-480D-BCC0-092F67052ED0}" dt="2025-01-15T02:32:49.487" v="5902" actId="20577"/>
@@ -635,22 +359,6 @@
             <ac:spMk id="2" creationId="{05B4AB10-AAEF-9C73-4029-2DFC460907D8}"/>
           </ac:spMkLst>
         </pc:spChg>
-        <pc:spChg chg="del">
-          <ac:chgData name="David A. Gee" userId="e9ce1845d50193f0" providerId="LiveId" clId="{0A2BC17E-C437-480D-BCC0-092F67052ED0}" dt="2025-01-15T02:33:24.189" v="5925"/>
-          <ac:spMkLst>
-            <pc:docMk/>
-            <pc:sldMk cId="1779408245" sldId="265"/>
-            <ac:spMk id="3" creationId="{15444651-E8AE-B588-60C6-2C6219F3F4A9}"/>
-          </ac:spMkLst>
-        </pc:spChg>
-        <pc:spChg chg="del">
-          <ac:chgData name="David A. Gee" userId="e9ce1845d50193f0" providerId="LiveId" clId="{0A2BC17E-C437-480D-BCC0-092F67052ED0}" dt="2025-01-15T02:33:30.886" v="5927"/>
-          <ac:spMkLst>
-            <pc:docMk/>
-            <pc:sldMk cId="1779408245" sldId="265"/>
-            <ac:spMk id="4" creationId="{9601E581-9D89-5409-6B69-4CC2E6145208}"/>
-          </ac:spMkLst>
-        </pc:spChg>
         <pc:spChg chg="add mod">
           <ac:chgData name="David A. Gee" userId="e9ce1845d50193f0" providerId="LiveId" clId="{0A2BC17E-C437-480D-BCC0-092F67052ED0}" dt="2025-01-15T02:39:05.717" v="6853" actId="20577"/>
           <ac:spMkLst>
@@ -676,55 +384,15 @@
           </ac:picMkLst>
         </pc:picChg>
       </pc:sldChg>
-      <pc:sldChg chg="addSp delSp modSp new mod">
-        <pc:chgData name="David A. Gee" userId="e9ce1845d50193f0" providerId="LiveId" clId="{0A2BC17E-C437-480D-BCC0-092F67052ED0}" dt="2025-01-15T02:43:18.478" v="7286" actId="21"/>
+      <pc:sldChg chg="addSp delSp modSp new del mod">
+        <pc:chgData name="David A. Gee" userId="e9ce1845d50193f0" providerId="LiveId" clId="{0A2BC17E-C437-480D-BCC0-092F67052ED0}" dt="2025-01-16T23:28:50.734" v="8183" actId="47"/>
         <pc:sldMkLst>
           <pc:docMk/>
           <pc:sldMk cId="2985598710" sldId="266"/>
         </pc:sldMkLst>
-        <pc:spChg chg="mod">
-          <ac:chgData name="David A. Gee" userId="e9ce1845d50193f0" providerId="LiveId" clId="{0A2BC17E-C437-480D-BCC0-092F67052ED0}" dt="2025-01-15T02:39:48.782" v="6869" actId="20577"/>
-          <ac:spMkLst>
-            <pc:docMk/>
-            <pc:sldMk cId="2985598710" sldId="266"/>
-            <ac:spMk id="2" creationId="{C65D610B-0772-AC82-1158-1623B66BC27F}"/>
-          </ac:spMkLst>
-        </pc:spChg>
-        <pc:spChg chg="del">
-          <ac:chgData name="David A. Gee" userId="e9ce1845d50193f0" providerId="LiveId" clId="{0A2BC17E-C437-480D-BCC0-092F67052ED0}" dt="2025-01-15T02:39:24.305" v="6855"/>
-          <ac:spMkLst>
-            <pc:docMk/>
-            <pc:sldMk cId="2985598710" sldId="266"/>
-            <ac:spMk id="3" creationId="{E600F725-305B-881F-0C47-48556749531E}"/>
-          </ac:spMkLst>
-        </pc:spChg>
-        <pc:spChg chg="mod">
-          <ac:chgData name="David A. Gee" userId="e9ce1845d50193f0" providerId="LiveId" clId="{0A2BC17E-C437-480D-BCC0-092F67052ED0}" dt="2025-01-15T02:42:53.982" v="7271" actId="20577"/>
-          <ac:spMkLst>
-            <pc:docMk/>
-            <pc:sldMk cId="2985598710" sldId="266"/>
-            <ac:spMk id="4" creationId="{446615C9-C4E4-31F4-26E5-737FCB9567B8}"/>
-          </ac:spMkLst>
-        </pc:spChg>
-        <pc:spChg chg="add mod">
-          <ac:chgData name="David A. Gee" userId="e9ce1845d50193f0" providerId="LiveId" clId="{0A2BC17E-C437-480D-BCC0-092F67052ED0}" dt="2025-01-15T02:43:18.478" v="7286" actId="21"/>
-          <ac:spMkLst>
-            <pc:docMk/>
-            <pc:sldMk cId="2985598710" sldId="266"/>
-            <ac:spMk id="7" creationId="{BCF62284-F14B-AE49-C879-FDECEAB09E46}"/>
-          </ac:spMkLst>
-        </pc:spChg>
-        <pc:picChg chg="add del mod">
-          <ac:chgData name="David A. Gee" userId="e9ce1845d50193f0" providerId="LiveId" clId="{0A2BC17E-C437-480D-BCC0-092F67052ED0}" dt="2025-01-15T02:43:18.478" v="7286" actId="21"/>
-          <ac:picMkLst>
-            <pc:docMk/>
-            <pc:sldMk cId="2985598710" sldId="266"/>
-            <ac:picMk id="5" creationId="{4FA65DDA-8FE3-AEC8-CA19-439C4EDB5785}"/>
-          </ac:picMkLst>
-        </pc:picChg>
       </pc:sldChg>
       <pc:sldChg chg="modSp new mod">
-        <pc:chgData name="David A. Gee" userId="e9ce1845d50193f0" providerId="LiveId" clId="{0A2BC17E-C437-480D-BCC0-092F67052ED0}" dt="2025-01-15T02:42:34.796" v="7249" actId="20577"/>
+        <pc:chgData name="David A. Gee" userId="e9ce1845d50193f0" providerId="LiveId" clId="{0A2BC17E-C437-480D-BCC0-092F67052ED0}" dt="2025-01-17T00:03:40.612" v="8501" actId="20577"/>
         <pc:sldMkLst>
           <pc:docMk/>
           <pc:sldMk cId="782693780" sldId="267"/>
@@ -735,6 +403,14 @@
             <pc:docMk/>
             <pc:sldMk cId="782693780" sldId="267"/>
             <ac:spMk id="2" creationId="{40CADABC-D443-33D7-BEA7-F29D793A03F9}"/>
+          </ac:spMkLst>
+        </pc:spChg>
+        <pc:spChg chg="mod">
+          <ac:chgData name="David A. Gee" userId="e9ce1845d50193f0" providerId="LiveId" clId="{0A2BC17E-C437-480D-BCC0-092F67052ED0}" dt="2025-01-17T00:03:40.612" v="8501" actId="20577"/>
+          <ac:spMkLst>
+            <pc:docMk/>
+            <pc:sldMk cId="782693780" sldId="267"/>
+            <ac:spMk id="3" creationId="{D9BBC3C8-91ED-B184-AEC7-283A949A01E7}"/>
           </ac:spMkLst>
         </pc:spChg>
       </pc:sldChg>
@@ -760,20 +436,349 @@
             <ac:spMk id="3" creationId="{7A7B827D-75C4-31AC-DF58-6C7B7F50A149}"/>
           </ac:spMkLst>
         </pc:spChg>
-        <pc:spChg chg="del">
-          <ac:chgData name="David A. Gee" userId="e9ce1845d50193f0" providerId="LiveId" clId="{0A2BC17E-C437-480D-BCC0-092F67052ED0}" dt="2025-01-15T02:43:21.081" v="7287"/>
-          <ac:spMkLst>
-            <pc:docMk/>
-            <pc:sldMk cId="3054775918" sldId="268"/>
-            <ac:spMk id="4" creationId="{475622A3-05FE-3B7E-74A3-6F928988C78B}"/>
-          </ac:spMkLst>
-        </pc:spChg>
         <pc:picChg chg="add mod">
           <ac:chgData name="David A. Gee" userId="e9ce1845d50193f0" providerId="LiveId" clId="{0A2BC17E-C437-480D-BCC0-092F67052ED0}" dt="2025-01-15T02:43:31.052" v="7289" actId="1076"/>
           <ac:picMkLst>
             <pc:docMk/>
             <pc:sldMk cId="3054775918" sldId="268"/>
             <ac:picMk id="5" creationId="{4FA65DDA-8FE3-AEC8-CA19-439C4EDB5785}"/>
+          </ac:picMkLst>
+        </pc:picChg>
+      </pc:sldChg>
+      <pc:sldChg chg="modSp new mod">
+        <pc:chgData name="David A. Gee" userId="e9ce1845d50193f0" providerId="LiveId" clId="{0A2BC17E-C437-480D-BCC0-092F67052ED0}" dt="2025-01-16T23:29:21.309" v="8205" actId="20577"/>
+        <pc:sldMkLst>
+          <pc:docMk/>
+          <pc:sldMk cId="4110609550" sldId="269"/>
+        </pc:sldMkLst>
+        <pc:spChg chg="mod">
+          <ac:chgData name="David A. Gee" userId="e9ce1845d50193f0" providerId="LiveId" clId="{0A2BC17E-C437-480D-BCC0-092F67052ED0}" dt="2025-01-16T23:29:21.309" v="8205" actId="20577"/>
+          <ac:spMkLst>
+            <pc:docMk/>
+            <pc:sldMk cId="4110609550" sldId="269"/>
+            <ac:spMk id="2" creationId="{36BA9868-FB21-06E4-1101-03B4BDC2528C}"/>
+          </ac:spMkLst>
+        </pc:spChg>
+      </pc:sldChg>
+      <pc:sldChg chg="addSp delSp modSp new mod">
+        <pc:chgData name="David A. Gee" userId="e9ce1845d50193f0" providerId="LiveId" clId="{0A2BC17E-C437-480D-BCC0-092F67052ED0}" dt="2025-01-16T23:58:47.031" v="8435"/>
+        <pc:sldMkLst>
+          <pc:docMk/>
+          <pc:sldMk cId="3705717800" sldId="270"/>
+        </pc:sldMkLst>
+        <pc:spChg chg="mod">
+          <ac:chgData name="David A. Gee" userId="e9ce1845d50193f0" providerId="LiveId" clId="{0A2BC17E-C437-480D-BCC0-092F67052ED0}" dt="2025-01-16T23:58:32.270" v="8434" actId="20577"/>
+          <ac:spMkLst>
+            <pc:docMk/>
+            <pc:sldMk cId="3705717800" sldId="270"/>
+            <ac:spMk id="2" creationId="{629C41B9-51D3-FF38-086F-7F79B7FC00F5}"/>
+          </ac:spMkLst>
+        </pc:spChg>
+        <pc:spChg chg="del">
+          <ac:chgData name="David A. Gee" userId="e9ce1845d50193f0" providerId="LiveId" clId="{0A2BC17E-C437-480D-BCC0-092F67052ED0}" dt="2025-01-16T23:55:38.414" v="8321"/>
+          <ac:spMkLst>
+            <pc:docMk/>
+            <pc:sldMk cId="3705717800" sldId="270"/>
+            <ac:spMk id="3" creationId="{850549DA-6BBB-51AD-65FE-0E3AAD38A9D2}"/>
+          </ac:spMkLst>
+        </pc:spChg>
+        <pc:spChg chg="del">
+          <ac:chgData name="David A. Gee" userId="e9ce1845d50193f0" providerId="LiveId" clId="{0A2BC17E-C437-480D-BCC0-092F67052ED0}" dt="2025-01-16T23:55:44.993" v="8324"/>
+          <ac:spMkLst>
+            <pc:docMk/>
+            <pc:sldMk cId="3705717800" sldId="270"/>
+            <ac:spMk id="4" creationId="{192AC64C-CB7B-86E9-5718-28180827EFDC}"/>
+          </ac:spMkLst>
+        </pc:spChg>
+        <pc:spChg chg="add mod">
+          <ac:chgData name="David A. Gee" userId="e9ce1845d50193f0" providerId="LiveId" clId="{0A2BC17E-C437-480D-BCC0-092F67052ED0}" dt="2025-01-16T23:58:04.132" v="8390" actId="14100"/>
+          <ac:spMkLst>
+            <pc:docMk/>
+            <pc:sldMk cId="3705717800" sldId="270"/>
+            <ac:spMk id="9" creationId="{D7C13119-5F11-58D8-4DFA-B4A4FD5150A6}"/>
+          </ac:spMkLst>
+        </pc:spChg>
+        <pc:spChg chg="add mod">
+          <ac:chgData name="David A. Gee" userId="e9ce1845d50193f0" providerId="LiveId" clId="{0A2BC17E-C437-480D-BCC0-092F67052ED0}" dt="2025-01-16T23:58:22.193" v="8417" actId="20577"/>
+          <ac:spMkLst>
+            <pc:docMk/>
+            <pc:sldMk cId="3705717800" sldId="270"/>
+            <ac:spMk id="10" creationId="{9CBD40BC-F031-F91F-9D25-88C7D71AF899}"/>
+          </ac:spMkLst>
+        </pc:spChg>
+        <pc:spChg chg="add mod">
+          <ac:chgData name="David A. Gee" userId="e9ce1845d50193f0" providerId="LiveId" clId="{0A2BC17E-C437-480D-BCC0-092F67052ED0}" dt="2025-01-16T23:58:47.031" v="8435"/>
+          <ac:spMkLst>
+            <pc:docMk/>
+            <pc:sldMk cId="3705717800" sldId="270"/>
+            <ac:spMk id="11" creationId="{362B504B-3B31-67B6-D3C6-C62FAE253591}"/>
+          </ac:spMkLst>
+        </pc:spChg>
+        <pc:picChg chg="add mod modCrop">
+          <ac:chgData name="David A. Gee" userId="e9ce1845d50193f0" providerId="LiveId" clId="{0A2BC17E-C437-480D-BCC0-092F67052ED0}" dt="2025-01-16T23:57:24.178" v="8340" actId="14100"/>
+          <ac:picMkLst>
+            <pc:docMk/>
+            <pc:sldMk cId="3705717800" sldId="270"/>
+            <ac:picMk id="6" creationId="{338545F8-6F66-69E3-466B-FDE531379D95}"/>
+          </ac:picMkLst>
+        </pc:picChg>
+        <pc:picChg chg="add mod modCrop">
+          <ac:chgData name="David A. Gee" userId="e9ce1845d50193f0" providerId="LiveId" clId="{0A2BC17E-C437-480D-BCC0-092F67052ED0}" dt="2025-01-16T23:57:08.991" v="8338" actId="14100"/>
+          <ac:picMkLst>
+            <pc:docMk/>
+            <pc:sldMk cId="3705717800" sldId="270"/>
+            <ac:picMk id="8" creationId="{43DB80FF-B267-31D4-1304-2489369EC147}"/>
+          </ac:picMkLst>
+        </pc:picChg>
+      </pc:sldChg>
+      <pc:sldChg chg="addSp delSp modSp add mod">
+        <pc:chgData name="David A. Gee" userId="e9ce1845d50193f0" providerId="LiveId" clId="{0A2BC17E-C437-480D-BCC0-092F67052ED0}" dt="2025-01-17T00:00:18.970" v="8471" actId="14100"/>
+        <pc:sldMkLst>
+          <pc:docMk/>
+          <pc:sldMk cId="3079534531" sldId="271"/>
+        </pc:sldMkLst>
+        <pc:spChg chg="mod">
+          <ac:chgData name="David A. Gee" userId="e9ce1845d50193f0" providerId="LiveId" clId="{0A2BC17E-C437-480D-BCC0-092F67052ED0}" dt="2025-01-16T23:59:05.510" v="8455" actId="20577"/>
+          <ac:spMkLst>
+            <pc:docMk/>
+            <pc:sldMk cId="3079534531" sldId="271"/>
+            <ac:spMk id="2" creationId="{0CA147CE-50F7-41B2-EE99-32657E965B42}"/>
+          </ac:spMkLst>
+        </pc:spChg>
+        <pc:spChg chg="add del mod">
+          <ac:chgData name="David A. Gee" userId="e9ce1845d50193f0" providerId="LiveId" clId="{0A2BC17E-C437-480D-BCC0-092F67052ED0}" dt="2025-01-16T23:59:19.418" v="8458"/>
+          <ac:spMkLst>
+            <pc:docMk/>
+            <pc:sldMk cId="3079534531" sldId="271"/>
+            <ac:spMk id="4" creationId="{678DDC25-C402-1391-2394-7CE4BFB6A1EC}"/>
+          </ac:spMkLst>
+        </pc:spChg>
+        <pc:spChg chg="add del mod">
+          <ac:chgData name="David A. Gee" userId="e9ce1845d50193f0" providerId="LiveId" clId="{0A2BC17E-C437-480D-BCC0-092F67052ED0}" dt="2025-01-16T23:59:27.436" v="8461"/>
+          <ac:spMkLst>
+            <pc:docMk/>
+            <pc:sldMk cId="3079534531" sldId="271"/>
+            <ac:spMk id="7" creationId="{2CCEEC12-515B-44CD-C85E-884DD10F96A5}"/>
+          </ac:spMkLst>
+        </pc:spChg>
+        <pc:picChg chg="del">
+          <ac:chgData name="David A. Gee" userId="e9ce1845d50193f0" providerId="LiveId" clId="{0A2BC17E-C437-480D-BCC0-092F67052ED0}" dt="2025-01-16T23:59:11.294" v="8457" actId="478"/>
+          <ac:picMkLst>
+            <pc:docMk/>
+            <pc:sldMk cId="3079534531" sldId="271"/>
+            <ac:picMk id="6" creationId="{BE9E025E-3518-7FDC-8CB8-D0625D680200}"/>
+          </ac:picMkLst>
+        </pc:picChg>
+        <pc:picChg chg="del">
+          <ac:chgData name="David A. Gee" userId="e9ce1845d50193f0" providerId="LiveId" clId="{0A2BC17E-C437-480D-BCC0-092F67052ED0}" dt="2025-01-16T23:59:08.617" v="8456" actId="478"/>
+          <ac:picMkLst>
+            <pc:docMk/>
+            <pc:sldMk cId="3079534531" sldId="271"/>
+            <ac:picMk id="8" creationId="{538FAE10-3C54-4A5E-3BB7-627C82056419}"/>
+          </ac:picMkLst>
+        </pc:picChg>
+        <pc:picChg chg="add mod modCrop">
+          <ac:chgData name="David A. Gee" userId="e9ce1845d50193f0" providerId="LiveId" clId="{0A2BC17E-C437-480D-BCC0-092F67052ED0}" dt="2025-01-17T00:00:18.970" v="8471" actId="14100"/>
+          <ac:picMkLst>
+            <pc:docMk/>
+            <pc:sldMk cId="3079534531" sldId="271"/>
+            <ac:picMk id="12" creationId="{8B5A8CD8-90AC-BD9C-EF17-146007D68E86}"/>
+          </ac:picMkLst>
+        </pc:picChg>
+        <pc:picChg chg="add mod modCrop">
+          <ac:chgData name="David A. Gee" userId="e9ce1845d50193f0" providerId="LiveId" clId="{0A2BC17E-C437-480D-BCC0-092F67052ED0}" dt="2025-01-17T00:00:06.764" v="8470" actId="14100"/>
+          <ac:picMkLst>
+            <pc:docMk/>
+            <pc:sldMk cId="3079534531" sldId="271"/>
+            <ac:picMk id="14" creationId="{329A3D7A-8150-FC70-3DEA-2D14584B199D}"/>
+          </ac:picMkLst>
+        </pc:picChg>
+      </pc:sldChg>
+      <pc:sldChg chg="addSp delSp modSp add del mod">
+        <pc:chgData name="David A. Gee" userId="e9ce1845d50193f0" providerId="LiveId" clId="{0A2BC17E-C437-480D-BCC0-092F67052ED0}" dt="2025-01-16T23:57:30.843" v="8341" actId="47"/>
+        <pc:sldMkLst>
+          <pc:docMk/>
+          <pc:sldMk cId="3668462512" sldId="271"/>
+        </pc:sldMkLst>
+        <pc:spChg chg="del">
+          <ac:chgData name="David A. Gee" userId="e9ce1845d50193f0" providerId="LiveId" clId="{0A2BC17E-C437-480D-BCC0-092F67052ED0}" dt="2025-01-16T23:55:11.197" v="8315"/>
+          <ac:spMkLst>
+            <pc:docMk/>
+            <pc:sldMk cId="3668462512" sldId="271"/>
+            <ac:spMk id="3" creationId="{8CE91D99-9AB3-4D9E-6597-D38389DDC746}"/>
+          </ac:spMkLst>
+        </pc:spChg>
+        <pc:spChg chg="del">
+          <ac:chgData name="David A. Gee" userId="e9ce1845d50193f0" providerId="LiveId" clId="{0A2BC17E-C437-480D-BCC0-092F67052ED0}" dt="2025-01-16T23:55:21.786" v="8318"/>
+          <ac:spMkLst>
+            <pc:docMk/>
+            <pc:sldMk cId="3668462512" sldId="271"/>
+            <ac:spMk id="4" creationId="{8CC445B6-C7E4-CB40-24AB-403524B6291F}"/>
+          </ac:spMkLst>
+        </pc:spChg>
+        <pc:picChg chg="add mod">
+          <ac:chgData name="David A. Gee" userId="e9ce1845d50193f0" providerId="LiveId" clId="{0A2BC17E-C437-480D-BCC0-092F67052ED0}" dt="2025-01-16T23:55:13.218" v="8317" actId="962"/>
+          <ac:picMkLst>
+            <pc:docMk/>
+            <pc:sldMk cId="3668462512" sldId="271"/>
+            <ac:picMk id="6" creationId="{5A20085E-8E77-D75F-6F3F-26979A9C3CB3}"/>
+          </ac:picMkLst>
+        </pc:picChg>
+        <pc:picChg chg="add mod">
+          <ac:chgData name="David A. Gee" userId="e9ce1845d50193f0" providerId="LiveId" clId="{0A2BC17E-C437-480D-BCC0-092F67052ED0}" dt="2025-01-16T23:55:22.914" v="8320" actId="962"/>
+          <ac:picMkLst>
+            <pc:docMk/>
+            <pc:sldMk cId="3668462512" sldId="271"/>
+            <ac:picMk id="8" creationId="{A1ECF470-B893-60DB-9ED8-31391AA7BEDE}"/>
+          </ac:picMkLst>
+        </pc:picChg>
+      </pc:sldChg>
+      <pc:sldChg chg="modSp new mod">
+        <pc:chgData name="David A. Gee" userId="e9ce1845d50193f0" providerId="LiveId" clId="{0A2BC17E-C437-480D-BCC0-092F67052ED0}" dt="2025-01-17T00:39:01.457" v="11044" actId="20577"/>
+        <pc:sldMkLst>
+          <pc:docMk/>
+          <pc:sldMk cId="3101272637" sldId="272"/>
+        </pc:sldMkLst>
+        <pc:spChg chg="mod">
+          <ac:chgData name="David A. Gee" userId="e9ce1845d50193f0" providerId="LiveId" clId="{0A2BC17E-C437-480D-BCC0-092F67052ED0}" dt="2025-01-17T00:04:02.204" v="8529" actId="20577"/>
+          <ac:spMkLst>
+            <pc:docMk/>
+            <pc:sldMk cId="3101272637" sldId="272"/>
+            <ac:spMk id="2" creationId="{9645D4F8-093A-DB45-B629-006F175DBBCD}"/>
+          </ac:spMkLst>
+        </pc:spChg>
+        <pc:spChg chg="mod">
+          <ac:chgData name="David A. Gee" userId="e9ce1845d50193f0" providerId="LiveId" clId="{0A2BC17E-C437-480D-BCC0-092F67052ED0}" dt="2025-01-17T00:39:01.457" v="11044" actId="20577"/>
+          <ac:spMkLst>
+            <pc:docMk/>
+            <pc:sldMk cId="3101272637" sldId="272"/>
+            <ac:spMk id="3" creationId="{1E9A0269-FDCC-8265-690E-D6CB87D37878}"/>
+          </ac:spMkLst>
+        </pc:spChg>
+      </pc:sldChg>
+      <pc:sldChg chg="new del">
+        <pc:chgData name="David A. Gee" userId="e9ce1845d50193f0" providerId="LiveId" clId="{0A2BC17E-C437-480D-BCC0-092F67052ED0}" dt="2025-01-17T00:03:50.037" v="8503" actId="47"/>
+        <pc:sldMkLst>
+          <pc:docMk/>
+          <pc:sldMk cId="3256150316" sldId="272"/>
+        </pc:sldMkLst>
+      </pc:sldChg>
+      <pc:sldChg chg="addSp delSp modSp new mod">
+        <pc:chgData name="David A. Gee" userId="e9ce1845d50193f0" providerId="LiveId" clId="{0A2BC17E-C437-480D-BCC0-092F67052ED0}" dt="2025-01-17T00:28:42.949" v="9310" actId="208"/>
+        <pc:sldMkLst>
+          <pc:docMk/>
+          <pc:sldMk cId="3589008766" sldId="273"/>
+        </pc:sldMkLst>
+        <pc:spChg chg="del">
+          <ac:chgData name="David A. Gee" userId="e9ce1845d50193f0" providerId="LiveId" clId="{0A2BC17E-C437-480D-BCC0-092F67052ED0}" dt="2025-01-17T00:18:07.997" v="8754" actId="478"/>
+          <ac:spMkLst>
+            <pc:docMk/>
+            <pc:sldMk cId="3589008766" sldId="273"/>
+            <ac:spMk id="2" creationId="{D20C98A4-27F5-7151-ECA8-EB1B2CE1908E}"/>
+          </ac:spMkLst>
+        </pc:spChg>
+        <pc:spChg chg="del mod">
+          <ac:chgData name="David A. Gee" userId="e9ce1845d50193f0" providerId="LiveId" clId="{0A2BC17E-C437-480D-BCC0-092F67052ED0}" dt="2025-01-17T00:20:24.543" v="8780" actId="478"/>
+          <ac:spMkLst>
+            <pc:docMk/>
+            <pc:sldMk cId="3589008766" sldId="273"/>
+            <ac:spMk id="3" creationId="{AA2968B2-9A44-50F6-659B-BF3D511F77FB}"/>
+          </ac:spMkLst>
+        </pc:spChg>
+        <pc:spChg chg="del mod">
+          <ac:chgData name="David A. Gee" userId="e9ce1845d50193f0" providerId="LiveId" clId="{0A2BC17E-C437-480D-BCC0-092F67052ED0}" dt="2025-01-17T00:19:25.405" v="8759"/>
+          <ac:spMkLst>
+            <pc:docMk/>
+            <pc:sldMk cId="3589008766" sldId="273"/>
+            <ac:spMk id="4" creationId="{3F973C07-45C3-CD45-373C-972D64FF9332}"/>
+          </ac:spMkLst>
+        </pc:spChg>
+        <pc:spChg chg="mod">
+          <ac:chgData name="David A. Gee" userId="e9ce1845d50193f0" providerId="LiveId" clId="{0A2BC17E-C437-480D-BCC0-092F67052ED0}" dt="2025-01-17T00:28:42.949" v="9310" actId="208"/>
+          <ac:spMkLst>
+            <pc:docMk/>
+            <pc:sldMk cId="3589008766" sldId="273"/>
+            <ac:spMk id="5" creationId="{A673B7D8-035D-31D5-3D73-DE06E167F035}"/>
+          </ac:spMkLst>
+        </pc:spChg>
+        <pc:spChg chg="del mod">
+          <ac:chgData name="David A. Gee" userId="e9ce1845d50193f0" providerId="LiveId" clId="{0A2BC17E-C437-480D-BCC0-092F67052ED0}" dt="2025-01-17T00:19:32.626" v="8762"/>
+          <ac:spMkLst>
+            <pc:docMk/>
+            <pc:sldMk cId="3589008766" sldId="273"/>
+            <ac:spMk id="6" creationId="{4B77E54E-C6EE-C9E5-AE04-86E5445A20AA}"/>
+          </ac:spMkLst>
+        </pc:spChg>
+        <pc:spChg chg="add del mod">
+          <ac:chgData name="David A. Gee" userId="e9ce1845d50193f0" providerId="LiveId" clId="{0A2BC17E-C437-480D-BCC0-092F67052ED0}" dt="2025-01-17T00:20:15.430" v="8777" actId="478"/>
+          <ac:spMkLst>
+            <pc:docMk/>
+            <pc:sldMk cId="3589008766" sldId="273"/>
+            <ac:spMk id="15" creationId="{54A78374-F653-408F-B9D9-8F09ED9300FD}"/>
+          </ac:spMkLst>
+        </pc:spChg>
+        <pc:spChg chg="add del mod">
+          <ac:chgData name="David A. Gee" userId="e9ce1845d50193f0" providerId="LiveId" clId="{0A2BC17E-C437-480D-BCC0-092F67052ED0}" dt="2025-01-17T00:20:21.445" v="8779" actId="478"/>
+          <ac:spMkLst>
+            <pc:docMk/>
+            <pc:sldMk cId="3589008766" sldId="273"/>
+            <ac:spMk id="17" creationId="{6D5BAAB5-845B-A6AC-498E-E2DDF56EFC92}"/>
+          </ac:spMkLst>
+        </pc:spChg>
+        <pc:picChg chg="add del mod">
+          <ac:chgData name="David A. Gee" userId="e9ce1845d50193f0" providerId="LiveId" clId="{0A2BC17E-C437-480D-BCC0-092F67052ED0}" dt="2025-01-17T00:20:19.289" v="8778" actId="478"/>
+          <ac:picMkLst>
+            <pc:docMk/>
+            <pc:sldMk cId="3589008766" sldId="273"/>
+            <ac:picMk id="8" creationId="{4A01F135-B3CA-CA2F-FE54-2E05D0BA14AE}"/>
+          </ac:picMkLst>
+        </pc:picChg>
+        <pc:picChg chg="add del mod">
+          <ac:chgData name="David A. Gee" userId="e9ce1845d50193f0" providerId="LiveId" clId="{0A2BC17E-C437-480D-BCC0-092F67052ED0}" dt="2025-01-17T00:20:13.303" v="8776" actId="478"/>
+          <ac:picMkLst>
+            <pc:docMk/>
+            <pc:sldMk cId="3589008766" sldId="273"/>
+            <ac:picMk id="10" creationId="{1360BF4B-194F-235E-8B33-AF32B0D0BDCD}"/>
+          </ac:picMkLst>
+        </pc:picChg>
+        <pc:picChg chg="add del mod">
+          <ac:chgData name="David A. Gee" userId="e9ce1845d50193f0" providerId="LiveId" clId="{0A2BC17E-C437-480D-BCC0-092F67052ED0}" dt="2025-01-17T00:19:50.210" v="8769" actId="478"/>
+          <ac:picMkLst>
+            <pc:docMk/>
+            <pc:sldMk cId="3589008766" sldId="273"/>
+            <ac:picMk id="11" creationId="{868DC9E0-C840-FA47-65D4-8465597E47C5}"/>
+          </ac:picMkLst>
+        </pc:picChg>
+        <pc:picChg chg="add mod modCrop">
+          <ac:chgData name="David A. Gee" userId="e9ce1845d50193f0" providerId="LiveId" clId="{0A2BC17E-C437-480D-BCC0-092F67052ED0}" dt="2025-01-17T00:23:08.614" v="8810" actId="1076"/>
+          <ac:picMkLst>
+            <pc:docMk/>
+            <pc:sldMk cId="3589008766" sldId="273"/>
+            <ac:picMk id="13" creationId="{BD060ADD-9EB9-963B-9F06-B5628061C38F}"/>
+          </ac:picMkLst>
+        </pc:picChg>
+        <pc:picChg chg="add mod modCrop">
+          <ac:chgData name="David A. Gee" userId="e9ce1845d50193f0" providerId="LiveId" clId="{0A2BC17E-C437-480D-BCC0-092F67052ED0}" dt="2025-01-17T00:23:20.088" v="8812" actId="1076"/>
+          <ac:picMkLst>
+            <pc:docMk/>
+            <pc:sldMk cId="3589008766" sldId="273"/>
+            <ac:picMk id="19" creationId="{73EEB54B-909F-94E4-8FEC-3F7288F16C37}"/>
+          </ac:picMkLst>
+        </pc:picChg>
+        <pc:picChg chg="add mod modCrop">
+          <ac:chgData name="David A. Gee" userId="e9ce1845d50193f0" providerId="LiveId" clId="{0A2BC17E-C437-480D-BCC0-092F67052ED0}" dt="2025-01-17T00:23:27.454" v="8814" actId="1076"/>
+          <ac:picMkLst>
+            <pc:docMk/>
+            <pc:sldMk cId="3589008766" sldId="273"/>
+            <ac:picMk id="21" creationId="{0FDBAD83-53FD-866D-485E-DA68D919DFDA}"/>
+          </ac:picMkLst>
+        </pc:picChg>
+        <pc:picChg chg="add mod modCrop">
+          <ac:chgData name="David A. Gee" userId="e9ce1845d50193f0" providerId="LiveId" clId="{0A2BC17E-C437-480D-BCC0-092F67052ED0}" dt="2025-01-17T00:23:37.071" v="8816" actId="1076"/>
+          <ac:picMkLst>
+            <pc:docMk/>
+            <pc:sldMk cId="3589008766" sldId="273"/>
+            <ac:picMk id="23" creationId="{369B839F-4E53-062E-49DA-2D32E8EFDA70}"/>
           </ac:picMkLst>
         </pc:picChg>
       </pc:sldChg>
@@ -864,7 +869,7 @@
           <a:p>
             <a:fld id="{5B5C660C-41C2-47F9-80D9-087AF432765D}" type="datetimeFigureOut">
               <a:rPr lang="en-US" smtClean="0"/>
-              <a:t>1/14/2025</a:t>
+              <a:t>1/16/2025</a:t>
             </a:fld>
             <a:endParaRPr lang="en-US"/>
           </a:p>
@@ -1988,7 +1993,7 @@
           <a:p>
             <a:fld id="{2E606BC1-9B07-47CD-B9EE-CDACB63EDD9B}" type="datetimeFigureOut">
               <a:rPr lang="en-US" smtClean="0"/>
-              <a:t>1/14/2025</a:t>
+              <a:t>1/16/2025</a:t>
             </a:fld>
             <a:endParaRPr lang="en-US"/>
           </a:p>
@@ -2239,7 +2244,7 @@
           <a:p>
             <a:fld id="{2E606BC1-9B07-47CD-B9EE-CDACB63EDD9B}" type="datetimeFigureOut">
               <a:rPr lang="en-US" smtClean="0"/>
-              <a:t>1/14/2025</a:t>
+              <a:t>1/16/2025</a:t>
             </a:fld>
             <a:endParaRPr lang="en-US"/>
           </a:p>
@@ -2553,7 +2558,7 @@
           <a:p>
             <a:fld id="{2E606BC1-9B07-47CD-B9EE-CDACB63EDD9B}" type="datetimeFigureOut">
               <a:rPr lang="en-US" smtClean="0"/>
-              <a:t>1/14/2025</a:t>
+              <a:t>1/16/2025</a:t>
             </a:fld>
             <a:endParaRPr lang="en-US"/>
           </a:p>
@@ -2894,7 +2899,7 @@
           <a:p>
             <a:fld id="{2E606BC1-9B07-47CD-B9EE-CDACB63EDD9B}" type="datetimeFigureOut">
               <a:rPr lang="en-US" smtClean="0"/>
-              <a:t>1/14/2025</a:t>
+              <a:t>1/16/2025</a:t>
             </a:fld>
             <a:endParaRPr lang="en-US"/>
           </a:p>
@@ -3208,7 +3213,7 @@
           <a:p>
             <a:fld id="{2E606BC1-9B07-47CD-B9EE-CDACB63EDD9B}" type="datetimeFigureOut">
               <a:rPr lang="en-US" smtClean="0"/>
-              <a:t>1/14/2025</a:t>
+              <a:t>1/16/2025</a:t>
             </a:fld>
             <a:endParaRPr lang="en-US"/>
           </a:p>
@@ -3601,7 +3606,7 @@
           <a:p>
             <a:fld id="{2E606BC1-9B07-47CD-B9EE-CDACB63EDD9B}" type="datetimeFigureOut">
               <a:rPr lang="en-US" smtClean="0"/>
-              <a:t>1/14/2025</a:t>
+              <a:t>1/16/2025</a:t>
             </a:fld>
             <a:endParaRPr lang="en-US"/>
           </a:p>
@@ -3771,7 +3776,7 @@
           <a:p>
             <a:fld id="{2E606BC1-9B07-47CD-B9EE-CDACB63EDD9B}" type="datetimeFigureOut">
               <a:rPr lang="en-US" smtClean="0"/>
-              <a:t>1/14/2025</a:t>
+              <a:t>1/16/2025</a:t>
             </a:fld>
             <a:endParaRPr lang="en-US"/>
           </a:p>
@@ -3951,7 +3956,7 @@
           <a:p>
             <a:fld id="{2E606BC1-9B07-47CD-B9EE-CDACB63EDD9B}" type="datetimeFigureOut">
               <a:rPr lang="en-US" smtClean="0"/>
-              <a:t>1/14/2025</a:t>
+              <a:t>1/16/2025</a:t>
             </a:fld>
             <a:endParaRPr lang="en-US"/>
           </a:p>
@@ -4127,7 +4132,7 @@
           <a:p>
             <a:fld id="{2E606BC1-9B07-47CD-B9EE-CDACB63EDD9B}" type="datetimeFigureOut">
               <a:rPr lang="en-US" smtClean="0"/>
-              <a:t>1/14/2025</a:t>
+              <a:t>1/16/2025</a:t>
             </a:fld>
             <a:endParaRPr lang="en-US"/>
           </a:p>
@@ -4374,7 +4379,7 @@
           <a:p>
             <a:fld id="{2E606BC1-9B07-47CD-B9EE-CDACB63EDD9B}" type="datetimeFigureOut">
               <a:rPr lang="en-US" smtClean="0"/>
-              <a:t>1/14/2025</a:t>
+              <a:t>1/16/2025</a:t>
             </a:fld>
             <a:endParaRPr lang="en-US"/>
           </a:p>
@@ -4606,7 +4611,7 @@
           <a:p>
             <a:fld id="{2E606BC1-9B07-47CD-B9EE-CDACB63EDD9B}" type="datetimeFigureOut">
               <a:rPr lang="en-US" smtClean="0"/>
-              <a:t>1/14/2025</a:t>
+              <a:t>1/16/2025</a:t>
             </a:fld>
             <a:endParaRPr lang="en-US"/>
           </a:p>
@@ -4980,7 +4985,7 @@
           <a:p>
             <a:fld id="{2E606BC1-9B07-47CD-B9EE-CDACB63EDD9B}" type="datetimeFigureOut">
               <a:rPr lang="en-US" smtClean="0"/>
-              <a:t>1/14/2025</a:t>
+              <a:t>1/16/2025</a:t>
             </a:fld>
             <a:endParaRPr lang="en-US"/>
           </a:p>
@@ -5103,7 +5108,7 @@
           <a:p>
             <a:fld id="{2E606BC1-9B07-47CD-B9EE-CDACB63EDD9B}" type="datetimeFigureOut">
               <a:rPr lang="en-US" smtClean="0"/>
-              <a:t>1/14/2025</a:t>
+              <a:t>1/16/2025</a:t>
             </a:fld>
             <a:endParaRPr lang="en-US"/>
           </a:p>
@@ -5198,7 +5203,7 @@
           <a:p>
             <a:fld id="{2E606BC1-9B07-47CD-B9EE-CDACB63EDD9B}" type="datetimeFigureOut">
               <a:rPr lang="en-US" smtClean="0"/>
-              <a:t>1/14/2025</a:t>
+              <a:t>1/16/2025</a:t>
             </a:fld>
             <a:endParaRPr lang="en-US"/>
           </a:p>
@@ -5453,7 +5458,7 @@
           <a:p>
             <a:fld id="{2E606BC1-9B07-47CD-B9EE-CDACB63EDD9B}" type="datetimeFigureOut">
               <a:rPr lang="en-US" smtClean="0"/>
-              <a:t>1/14/2025</a:t>
+              <a:t>1/16/2025</a:t>
             </a:fld>
             <a:endParaRPr lang="en-US"/>
           </a:p>
@@ -5716,7 +5721,7 @@
           <a:p>
             <a:fld id="{2E606BC1-9B07-47CD-B9EE-CDACB63EDD9B}" type="datetimeFigureOut">
               <a:rPr lang="en-US" smtClean="0"/>
-              <a:t>1/14/2025</a:t>
+              <a:t>1/16/2025</a:t>
             </a:fld>
             <a:endParaRPr lang="en-US"/>
           </a:p>
@@ -6459,7 +6464,7 @@
           <a:p>
             <a:fld id="{2E606BC1-9B07-47CD-B9EE-CDACB63EDD9B}" type="datetimeFigureOut">
               <a:rPr lang="en-US" smtClean="0"/>
-              <a:t>1/14/2025</a:t>
+              <a:t>1/16/2025</a:t>
             </a:fld>
             <a:endParaRPr lang="en-US"/>
           </a:p>
@@ -7071,7 +7076,7 @@
           <p:cNvPr id="2" name="Title 1">
             <a:extLst>
               <a:ext uri="{FF2B5EF4-FFF2-40B4-BE49-F238E27FC236}">
-                <a16:creationId xmlns:a16="http://schemas.microsoft.com/office/drawing/2014/main" id="{489B43F2-265E-426C-FC6C-CB689360B9F0}"/>
+                <a16:creationId xmlns:a16="http://schemas.microsoft.com/office/drawing/2014/main" id="{36BA9868-FB21-06E4-1101-03B4BDC2528C}"/>
               </a:ext>
             </a:extLst>
           </p:cNvPr>
@@ -7089,136 +7094,15 @@
           <a:p>
             <a:r>
               <a:rPr lang="en-US" dirty="0"/>
-              <a:t>Take-away</a:t>
-            </a:r>
-          </a:p>
-        </p:txBody>
-      </p:sp>
-      <p:sp>
-        <p:nvSpPr>
-          <p:cNvPr id="3" name="Content Placeholder 2">
-            <a:extLst>
-              <a:ext uri="{FF2B5EF4-FFF2-40B4-BE49-F238E27FC236}">
-                <a16:creationId xmlns:a16="http://schemas.microsoft.com/office/drawing/2014/main" id="{7A7B827D-75C4-31AC-DF58-6C7B7F50A149}"/>
-              </a:ext>
-            </a:extLst>
-          </p:cNvPr>
-          <p:cNvSpPr>
-            <a:spLocks noGrp="1"/>
-          </p:cNvSpPr>
-          <p:nvPr>
-            <p:ph sz="half" idx="1"/>
-          </p:nvPr>
-        </p:nvSpPr>
-        <p:spPr>
-          <a:xfrm>
-            <a:off x="677334" y="2160589"/>
-            <a:ext cx="6041100" cy="3880772"/>
-          </a:xfrm>
-        </p:spPr>
-        <p:txBody>
-          <a:bodyPr>
-            <a:normAutofit fontScale="92500"/>
-          </a:bodyPr>
-          <a:lstStyle/>
-          <a:p>
-            <a:r>
-              <a:rPr lang="en-US" dirty="0"/>
-              <a:t>The parks are fairly diverse as a whole, but the parks are not </a:t>
-            </a:r>
-            <a:r>
-              <a:rPr lang="en-US" i="1" dirty="0"/>
-              <a:t>evenly</a:t>
-            </a:r>
-            <a:r>
-              <a:rPr lang="en-US" dirty="0"/>
-              <a:t> diverse</a:t>
-            </a:r>
-          </a:p>
-          <a:p>
-            <a:r>
-              <a:rPr lang="en-US" dirty="0"/>
-              <a:t>Foci</a:t>
-            </a:r>
-          </a:p>
-          <a:p>
-            <a:pPr lvl="1"/>
-            <a:r>
-              <a:rPr lang="en-US" dirty="0"/>
-              <a:t>The data shows that Amphibian and Reptile species are the least diverse amongst the species represented in the sample</a:t>
-            </a:r>
-          </a:p>
-          <a:p>
-            <a:r>
-              <a:rPr lang="en-US" dirty="0"/>
-              <a:t>Additional</a:t>
-            </a:r>
-          </a:p>
-          <a:p>
-            <a:pPr lvl="1"/>
-            <a:r>
-              <a:rPr lang="en-US" dirty="0"/>
-              <a:t>When deciding resource allocation or expansion, keeping these species in mind could buttress an argument for expanding areas with compatible habitats</a:t>
-            </a:r>
-          </a:p>
-          <a:p>
-            <a:pPr lvl="1"/>
-            <a:r>
-              <a:rPr lang="en-US" dirty="0"/>
-              <a:t>With campaigning or public outreach, the Species dataset could provide insight as to which species in these taxonomic categories could be used in a visual piece</a:t>
-            </a:r>
-          </a:p>
-          <a:p>
-            <a:pPr lvl="1"/>
-            <a:endParaRPr lang="en-US" dirty="0"/>
-          </a:p>
-        </p:txBody>
-      </p:sp>
-      <p:pic>
-        <p:nvPicPr>
-          <p:cNvPr id="5" name="Content Placeholder 10" descr="A comparison of a graph&#10;&#10;Description automatically generated with medium confidence">
-            <a:extLst>
-              <a:ext uri="{FF2B5EF4-FFF2-40B4-BE49-F238E27FC236}">
-                <a16:creationId xmlns:a16="http://schemas.microsoft.com/office/drawing/2014/main" id="{4FA65DDA-8FE3-AEC8-CA19-439C4EDB5785}"/>
-              </a:ext>
-            </a:extLst>
-          </p:cNvPr>
-          <p:cNvPicPr>
-            <a:picLocks noGrp="1" noChangeAspect="1"/>
-          </p:cNvPicPr>
-          <p:nvPr>
-            <p:ph sz="half" idx="2"/>
-          </p:nvPr>
-        </p:nvPicPr>
-        <p:blipFill>
-          <a:blip r:embed="rId2">
-            <a:extLst>
-              <a:ext uri="{28A0092B-C50C-407E-A947-70E740481C1C}">
-                <a14:useLocalDpi xmlns:a14="http://schemas.microsoft.com/office/drawing/2010/main" val="0"/>
-              </a:ext>
-            </a:extLst>
-          </a:blip>
-          <a:srcRect l="50012" t="7279" r="9446"/>
-          <a:stretch/>
-        </p:blipFill>
-        <p:spPr bwMode="auto">
-          <a:xfrm>
-            <a:off x="6952832" y="66029"/>
-            <a:ext cx="3529079" cy="6725942"/>
-          </a:xfrm>
-          <a:prstGeom prst="rect">
-            <a:avLst/>
-          </a:prstGeom>
-          <a:noFill/>
-          <a:ln>
-            <a:noFill/>
-          </a:ln>
-        </p:spPr>
-      </p:pic>
+              <a:t>Questions and Answers</a:t>
+            </a:r>
+          </a:p>
+        </p:txBody>
+      </p:sp>
     </p:spTree>
     <p:extLst>
       <p:ext uri="{BB962C8B-B14F-4D97-AF65-F5344CB8AC3E}">
-        <p14:creationId xmlns:p14="http://schemas.microsoft.com/office/powerpoint/2010/main" val="3054775918"/>
+        <p14:creationId xmlns:p14="http://schemas.microsoft.com/office/powerpoint/2010/main" val="4110609550"/>
       </p:ext>
     </p:extLst>
   </p:cSld>
@@ -7294,7 +7178,34 @@
           <a:bodyPr/>
           <a:lstStyle/>
           <a:p>
-            <a:endParaRPr lang="en-US"/>
+            <a:pPr>
+              <a:buFont typeface="+mj-lt"/>
+              <a:buAutoNum type="arabicPeriod"/>
+            </a:pPr>
+            <a:r>
+              <a:rPr lang="en-US" dirty="0"/>
+              <a:t>Species Dataset and Description</a:t>
+            </a:r>
+          </a:p>
+          <a:p>
+            <a:pPr>
+              <a:buFont typeface="+mj-lt"/>
+              <a:buAutoNum type="arabicPeriod"/>
+            </a:pPr>
+            <a:r>
+              <a:rPr lang="en-US" dirty="0"/>
+              <a:t>Observations Dataset and Description</a:t>
+            </a:r>
+          </a:p>
+          <a:p>
+            <a:pPr>
+              <a:buFont typeface="+mj-lt"/>
+              <a:buAutoNum type="arabicPeriod"/>
+            </a:pPr>
+            <a:r>
+              <a:rPr lang="en-US" dirty="0"/>
+              <a:t>Areas of additional study</a:t>
+            </a:r>
           </a:p>
         </p:txBody>
       </p:sp>
@@ -7302,6 +7213,757 @@
     <p:extLst>
       <p:ext uri="{BB962C8B-B14F-4D97-AF65-F5344CB8AC3E}">
         <p14:creationId xmlns:p14="http://schemas.microsoft.com/office/powerpoint/2010/main" val="782693780"/>
+      </p:ext>
+    </p:extLst>
+  </p:cSld>
+  <p:clrMapOvr>
+    <a:masterClrMapping/>
+  </p:clrMapOvr>
+</p:sld>
+</file>
+
+<file path=ppt/slides/slide12.xml><?xml version="1.0" encoding="utf-8"?>
+<p:sld xmlns:a="http://schemas.openxmlformats.org/drawingml/2006/main" xmlns:r="http://schemas.openxmlformats.org/officeDocument/2006/relationships" xmlns:p="http://schemas.openxmlformats.org/presentationml/2006/main">
+  <p:cSld>
+    <p:spTree>
+      <p:nvGrpSpPr>
+        <p:cNvPr id="1" name=""/>
+        <p:cNvGrpSpPr/>
+        <p:nvPr/>
+      </p:nvGrpSpPr>
+      <p:grpSpPr>
+        <a:xfrm>
+          <a:off x="0" y="0"/>
+          <a:ext cx="0" cy="0"/>
+          <a:chOff x="0" y="0"/>
+          <a:chExt cx="0" cy="0"/>
+        </a:xfrm>
+      </p:grpSpPr>
+      <p:sp>
+        <p:nvSpPr>
+          <p:cNvPr id="2" name="Title 1">
+            <a:extLst>
+              <a:ext uri="{FF2B5EF4-FFF2-40B4-BE49-F238E27FC236}">
+                <a16:creationId xmlns:a16="http://schemas.microsoft.com/office/drawing/2014/main" id="{629C41B9-51D3-FF38-086F-7F79B7FC00F5}"/>
+              </a:ext>
+            </a:extLst>
+          </p:cNvPr>
+          <p:cNvSpPr>
+            <a:spLocks noGrp="1"/>
+          </p:cNvSpPr>
+          <p:nvPr>
+            <p:ph type="title"/>
+          </p:nvPr>
+        </p:nvSpPr>
+        <p:spPr/>
+        <p:txBody>
+          <a:bodyPr/>
+          <a:lstStyle/>
+          <a:p>
+            <a:r>
+              <a:rPr lang="en-US" dirty="0"/>
+              <a:t>Species </a:t>
+            </a:r>
+            <a:r>
+              <a:rPr lang="en-US" dirty="0" err="1"/>
+              <a:t>Dataframe</a:t>
+            </a:r>
+            <a:endParaRPr lang="en-US" dirty="0"/>
+          </a:p>
+        </p:txBody>
+      </p:sp>
+      <p:pic>
+        <p:nvPicPr>
+          <p:cNvPr id="6" name="Content Placeholder 5" descr="A green and white text on a white background&#10;&#10;Description automatically generated">
+            <a:extLst>
+              <a:ext uri="{FF2B5EF4-FFF2-40B4-BE49-F238E27FC236}">
+                <a16:creationId xmlns:a16="http://schemas.microsoft.com/office/drawing/2014/main" id="{338545F8-6F66-69E3-466B-FDE531379D95}"/>
+              </a:ext>
+            </a:extLst>
+          </p:cNvPr>
+          <p:cNvPicPr>
+            <a:picLocks noGrp="1" noChangeAspect="1"/>
+          </p:cNvPicPr>
+          <p:nvPr>
+            <p:ph sz="half" idx="1"/>
+          </p:nvPr>
+        </p:nvPicPr>
+        <p:blipFill>
+          <a:blip r:embed="rId2">
+            <a:extLst>
+              <a:ext uri="{28A0092B-C50C-407E-A947-70E740481C1C}">
+                <a14:useLocalDpi xmlns:a14="http://schemas.microsoft.com/office/drawing/2010/main" val="0"/>
+              </a:ext>
+            </a:extLst>
+          </a:blip>
+          <a:srcRect l="12041" t="43792" r="8382" b="43467"/>
+          <a:stretch/>
+        </p:blipFill>
+        <p:spPr>
+          <a:xfrm>
+            <a:off x="677334" y="4203271"/>
+            <a:ext cx="11042027" cy="1087920"/>
+          </a:xfrm>
+        </p:spPr>
+      </p:pic>
+      <p:pic>
+        <p:nvPicPr>
+          <p:cNvPr id="8" name="Content Placeholder 7" descr="A green and white rectangular object with text&#10;&#10;Description automatically generated">
+            <a:extLst>
+              <a:ext uri="{FF2B5EF4-FFF2-40B4-BE49-F238E27FC236}">
+                <a16:creationId xmlns:a16="http://schemas.microsoft.com/office/drawing/2014/main" id="{43DB80FF-B267-31D4-1304-2489369EC147}"/>
+              </a:ext>
+            </a:extLst>
+          </p:cNvPr>
+          <p:cNvPicPr>
+            <a:picLocks noGrp="1" noChangeAspect="1"/>
+          </p:cNvPicPr>
+          <p:nvPr>
+            <p:ph sz="half" idx="2"/>
+          </p:nvPr>
+        </p:nvPicPr>
+        <p:blipFill>
+          <a:blip r:embed="rId3">
+            <a:extLst>
+              <a:ext uri="{28A0092B-C50C-407E-A947-70E740481C1C}">
+                <a14:useLocalDpi xmlns:a14="http://schemas.microsoft.com/office/drawing/2010/main" val="0"/>
+              </a:ext>
+            </a:extLst>
+          </a:blip>
+          <a:srcRect l="12430" t="40578" r="10230" b="36874"/>
+          <a:stretch/>
+        </p:blipFill>
+        <p:spPr>
+          <a:xfrm>
+            <a:off x="677334" y="2260314"/>
+            <a:ext cx="11065676" cy="1613043"/>
+          </a:xfrm>
+        </p:spPr>
+      </p:pic>
+      <p:sp>
+        <p:nvSpPr>
+          <p:cNvPr id="9" name="TextBox 8">
+            <a:extLst>
+              <a:ext uri="{FF2B5EF4-FFF2-40B4-BE49-F238E27FC236}">
+                <a16:creationId xmlns:a16="http://schemas.microsoft.com/office/drawing/2014/main" id="{D7C13119-5F11-58D8-4DFA-B4A4FD5150A6}"/>
+              </a:ext>
+            </a:extLst>
+          </p:cNvPr>
+          <p:cNvSpPr txBox="1"/>
+          <p:nvPr/>
+        </p:nvSpPr>
+        <p:spPr>
+          <a:xfrm>
+            <a:off x="677333" y="1994026"/>
+            <a:ext cx="4233713" cy="369332"/>
+          </a:xfrm>
+          <a:prstGeom prst="rect">
+            <a:avLst/>
+          </a:prstGeom>
+          <a:noFill/>
+        </p:spPr>
+        <p:txBody>
+          <a:bodyPr wrap="square" rtlCol="0">
+            <a:spAutoFit/>
+          </a:bodyPr>
+          <a:lstStyle/>
+          <a:p>
+            <a:r>
+              <a:rPr lang="en-US" dirty="0"/>
+              <a:t>First 5 rows of Data frame</a:t>
+            </a:r>
+          </a:p>
+        </p:txBody>
+      </p:sp>
+      <p:sp>
+        <p:nvSpPr>
+          <p:cNvPr id="10" name="TextBox 9">
+            <a:extLst>
+              <a:ext uri="{FF2B5EF4-FFF2-40B4-BE49-F238E27FC236}">
+                <a16:creationId xmlns:a16="http://schemas.microsoft.com/office/drawing/2014/main" id="{9CBD40BC-F031-F91F-9D25-88C7D71AF899}"/>
+              </a:ext>
+            </a:extLst>
+          </p:cNvPr>
+          <p:cNvSpPr txBox="1"/>
+          <p:nvPr/>
+        </p:nvSpPr>
+        <p:spPr>
+          <a:xfrm>
+            <a:off x="677333" y="3833939"/>
+            <a:ext cx="4233713" cy="369332"/>
+          </a:xfrm>
+          <a:prstGeom prst="rect">
+            <a:avLst/>
+          </a:prstGeom>
+          <a:noFill/>
+        </p:spPr>
+        <p:txBody>
+          <a:bodyPr wrap="square" rtlCol="0">
+            <a:spAutoFit/>
+          </a:bodyPr>
+          <a:lstStyle/>
+          <a:p>
+            <a:r>
+              <a:rPr lang="en-US" dirty="0"/>
+              <a:t>Description of Data frame</a:t>
+            </a:r>
+          </a:p>
+        </p:txBody>
+      </p:sp>
+    </p:spTree>
+    <p:extLst>
+      <p:ext uri="{BB962C8B-B14F-4D97-AF65-F5344CB8AC3E}">
+        <p14:creationId xmlns:p14="http://schemas.microsoft.com/office/powerpoint/2010/main" val="3705717800"/>
+      </p:ext>
+    </p:extLst>
+  </p:cSld>
+  <p:clrMapOvr>
+    <a:masterClrMapping/>
+  </p:clrMapOvr>
+</p:sld>
+</file>
+
+<file path=ppt/slides/slide13.xml><?xml version="1.0" encoding="utf-8"?>
+<p:sld xmlns:a="http://schemas.openxmlformats.org/drawingml/2006/main" xmlns:r="http://schemas.openxmlformats.org/officeDocument/2006/relationships" xmlns:p="http://schemas.openxmlformats.org/presentationml/2006/main">
+  <p:cSld>
+    <p:spTree>
+      <p:nvGrpSpPr>
+        <p:cNvPr id="1" name="">
+          <a:extLst>
+            <a:ext uri="{FF2B5EF4-FFF2-40B4-BE49-F238E27FC236}">
+              <a16:creationId xmlns:a16="http://schemas.microsoft.com/office/drawing/2014/main" id="{801570AC-2581-AD74-1BDB-B0EAE43E88D7}"/>
+            </a:ext>
+          </a:extLst>
+        </p:cNvPr>
+        <p:cNvGrpSpPr/>
+        <p:nvPr/>
+      </p:nvGrpSpPr>
+      <p:grpSpPr>
+        <a:xfrm>
+          <a:off x="0" y="0"/>
+          <a:ext cx="0" cy="0"/>
+          <a:chOff x="0" y="0"/>
+          <a:chExt cx="0" cy="0"/>
+        </a:xfrm>
+      </p:grpSpPr>
+      <p:sp>
+        <p:nvSpPr>
+          <p:cNvPr id="2" name="Title 1">
+            <a:extLst>
+              <a:ext uri="{FF2B5EF4-FFF2-40B4-BE49-F238E27FC236}">
+                <a16:creationId xmlns:a16="http://schemas.microsoft.com/office/drawing/2014/main" id="{0CA147CE-50F7-41B2-EE99-32657E965B42}"/>
+              </a:ext>
+            </a:extLst>
+          </p:cNvPr>
+          <p:cNvSpPr>
+            <a:spLocks noGrp="1"/>
+          </p:cNvSpPr>
+          <p:nvPr>
+            <p:ph type="title"/>
+          </p:nvPr>
+        </p:nvSpPr>
+        <p:spPr/>
+        <p:txBody>
+          <a:bodyPr/>
+          <a:lstStyle/>
+          <a:p>
+            <a:r>
+              <a:rPr lang="en-US" dirty="0"/>
+              <a:t>Observations </a:t>
+            </a:r>
+            <a:r>
+              <a:rPr lang="en-US" dirty="0" err="1"/>
+              <a:t>Dataframe</a:t>
+            </a:r>
+            <a:endParaRPr lang="en-US" dirty="0"/>
+          </a:p>
+        </p:txBody>
+      </p:sp>
+      <p:sp>
+        <p:nvSpPr>
+          <p:cNvPr id="9" name="TextBox 8">
+            <a:extLst>
+              <a:ext uri="{FF2B5EF4-FFF2-40B4-BE49-F238E27FC236}">
+                <a16:creationId xmlns:a16="http://schemas.microsoft.com/office/drawing/2014/main" id="{F97D0712-2D74-28A8-B27E-369C3C5CC233}"/>
+              </a:ext>
+            </a:extLst>
+          </p:cNvPr>
+          <p:cNvSpPr txBox="1"/>
+          <p:nvPr/>
+        </p:nvSpPr>
+        <p:spPr>
+          <a:xfrm>
+            <a:off x="677333" y="1994026"/>
+            <a:ext cx="4233713" cy="369332"/>
+          </a:xfrm>
+          <a:prstGeom prst="rect">
+            <a:avLst/>
+          </a:prstGeom>
+          <a:noFill/>
+        </p:spPr>
+        <p:txBody>
+          <a:bodyPr wrap="square" rtlCol="0">
+            <a:spAutoFit/>
+          </a:bodyPr>
+          <a:lstStyle/>
+          <a:p>
+            <a:r>
+              <a:rPr lang="en-US" dirty="0"/>
+              <a:t>First 5 rows of Data frame</a:t>
+            </a:r>
+          </a:p>
+        </p:txBody>
+      </p:sp>
+      <p:sp>
+        <p:nvSpPr>
+          <p:cNvPr id="10" name="TextBox 9">
+            <a:extLst>
+              <a:ext uri="{FF2B5EF4-FFF2-40B4-BE49-F238E27FC236}">
+                <a16:creationId xmlns:a16="http://schemas.microsoft.com/office/drawing/2014/main" id="{C398CDD0-2C4E-F617-C9C6-264849750011}"/>
+              </a:ext>
+            </a:extLst>
+          </p:cNvPr>
+          <p:cNvSpPr txBox="1"/>
+          <p:nvPr/>
+        </p:nvSpPr>
+        <p:spPr>
+          <a:xfrm>
+            <a:off x="677333" y="3833939"/>
+            <a:ext cx="4233713" cy="369332"/>
+          </a:xfrm>
+          <a:prstGeom prst="rect">
+            <a:avLst/>
+          </a:prstGeom>
+          <a:noFill/>
+        </p:spPr>
+        <p:txBody>
+          <a:bodyPr wrap="square" rtlCol="0">
+            <a:spAutoFit/>
+          </a:bodyPr>
+          <a:lstStyle/>
+          <a:p>
+            <a:r>
+              <a:rPr lang="en-US" dirty="0"/>
+              <a:t>Description of Data frame</a:t>
+            </a:r>
+          </a:p>
+        </p:txBody>
+      </p:sp>
+      <p:pic>
+        <p:nvPicPr>
+          <p:cNvPr id="12" name="Content Placeholder 11" descr="A table with numbers and text&#10;&#10;Description automatically generated with medium confidence">
+            <a:extLst>
+              <a:ext uri="{FF2B5EF4-FFF2-40B4-BE49-F238E27FC236}">
+                <a16:creationId xmlns:a16="http://schemas.microsoft.com/office/drawing/2014/main" id="{8B5A8CD8-90AC-BD9C-EF17-146007D68E86}"/>
+              </a:ext>
+            </a:extLst>
+          </p:cNvPr>
+          <p:cNvPicPr>
+            <a:picLocks noGrp="1" noChangeAspect="1"/>
+          </p:cNvPicPr>
+          <p:nvPr>
+            <p:ph sz="half" idx="2"/>
+          </p:nvPr>
+        </p:nvPicPr>
+        <p:blipFill>
+          <a:blip r:embed="rId2">
+            <a:extLst>
+              <a:ext uri="{28A0092B-C50C-407E-A947-70E740481C1C}">
+                <a14:useLocalDpi xmlns:a14="http://schemas.microsoft.com/office/drawing/2010/main" val="0"/>
+              </a:ext>
+            </a:extLst>
+          </a:blip>
+          <a:srcRect l="11694" t="31100" r="8022" b="29617"/>
+          <a:stretch/>
+        </p:blipFill>
+        <p:spPr>
+          <a:xfrm>
+            <a:off x="677332" y="4203270"/>
+            <a:ext cx="8710201" cy="2557125"/>
+          </a:xfrm>
+        </p:spPr>
+      </p:pic>
+      <p:pic>
+        <p:nvPicPr>
+          <p:cNvPr id="14" name="Content Placeholder 13" descr="A table with text and green and white stripes&#10;&#10;Description automatically generated with medium confidence">
+            <a:extLst>
+              <a:ext uri="{FF2B5EF4-FFF2-40B4-BE49-F238E27FC236}">
+                <a16:creationId xmlns:a16="http://schemas.microsoft.com/office/drawing/2014/main" id="{329A3D7A-8150-FC70-3DEA-2D14584B199D}"/>
+              </a:ext>
+            </a:extLst>
+          </p:cNvPr>
+          <p:cNvPicPr>
+            <a:picLocks noGrp="1" noChangeAspect="1"/>
+          </p:cNvPicPr>
+          <p:nvPr>
+            <p:ph sz="half" idx="1"/>
+          </p:nvPr>
+        </p:nvPicPr>
+        <p:blipFill>
+          <a:blip r:embed="rId3">
+            <a:extLst>
+              <a:ext uri="{28A0092B-C50C-407E-A947-70E740481C1C}">
+                <a14:useLocalDpi xmlns:a14="http://schemas.microsoft.com/office/drawing/2010/main" val="0"/>
+              </a:ext>
+            </a:extLst>
+          </a:blip>
+          <a:srcRect l="11549" t="39347" r="8627" b="39024"/>
+          <a:stretch/>
+        </p:blipFill>
+        <p:spPr>
+          <a:xfrm>
+            <a:off x="677333" y="2426983"/>
+            <a:ext cx="8654230" cy="1406955"/>
+          </a:xfrm>
+        </p:spPr>
+      </p:pic>
+    </p:spTree>
+    <p:extLst>
+      <p:ext uri="{BB962C8B-B14F-4D97-AF65-F5344CB8AC3E}">
+        <p14:creationId xmlns:p14="http://schemas.microsoft.com/office/powerpoint/2010/main" val="3079534531"/>
+      </p:ext>
+    </p:extLst>
+  </p:cSld>
+  <p:clrMapOvr>
+    <a:masterClrMapping/>
+  </p:clrMapOvr>
+</p:sld>
+</file>
+
+<file path=ppt/slides/slide14.xml><?xml version="1.0" encoding="utf-8"?>
+<p:sld xmlns:a="http://schemas.openxmlformats.org/drawingml/2006/main" xmlns:r="http://schemas.openxmlformats.org/officeDocument/2006/relationships" xmlns:p="http://schemas.openxmlformats.org/presentationml/2006/main">
+  <p:cSld>
+    <p:spTree>
+      <p:nvGrpSpPr>
+        <p:cNvPr id="1" name=""/>
+        <p:cNvGrpSpPr/>
+        <p:nvPr/>
+      </p:nvGrpSpPr>
+      <p:grpSpPr>
+        <a:xfrm>
+          <a:off x="0" y="0"/>
+          <a:ext cx="0" cy="0"/>
+          <a:chOff x="0" y="0"/>
+          <a:chExt cx="0" cy="0"/>
+        </a:xfrm>
+      </p:grpSpPr>
+      <p:sp>
+        <p:nvSpPr>
+          <p:cNvPr id="5" name="Text Placeholder 4">
+            <a:extLst>
+              <a:ext uri="{FF2B5EF4-FFF2-40B4-BE49-F238E27FC236}">
+                <a16:creationId xmlns:a16="http://schemas.microsoft.com/office/drawing/2014/main" id="{A673B7D8-035D-31D5-3D73-DE06E167F035}"/>
+              </a:ext>
+            </a:extLst>
+          </p:cNvPr>
+          <p:cNvSpPr>
+            <a:spLocks noGrp="1"/>
+          </p:cNvSpPr>
+          <p:nvPr>
+            <p:ph type="body" sz="quarter" idx="3"/>
+          </p:nvPr>
+        </p:nvSpPr>
+        <p:spPr>
+          <a:xfrm>
+            <a:off x="145773" y="154032"/>
+            <a:ext cx="11823619" cy="1217567"/>
+          </a:xfrm>
+          <a:solidFill>
+            <a:schemeClr val="bg1"/>
+          </a:solidFill>
+          <a:ln>
+            <a:solidFill>
+              <a:schemeClr val="tx1"/>
+            </a:solidFill>
+          </a:ln>
+        </p:spPr>
+        <p:txBody>
+          <a:bodyPr/>
+          <a:lstStyle/>
+          <a:p>
+            <a:r>
+              <a:rPr lang="en-US" dirty="0"/>
+              <a:t>It may be important to note how close the count of scientific names are and how conservation status count is the same across all 4 parks. The methodology of this study was not discussed in the exercise but could impact how applicable the data is.</a:t>
+            </a:r>
+          </a:p>
+        </p:txBody>
+      </p:sp>
+      <p:pic>
+        <p:nvPicPr>
+          <p:cNvPr id="13" name="Picture 12" descr="A green and white table with text&#10;&#10;Description automatically generated">
+            <a:extLst>
+              <a:ext uri="{FF2B5EF4-FFF2-40B4-BE49-F238E27FC236}">
+                <a16:creationId xmlns:a16="http://schemas.microsoft.com/office/drawing/2014/main" id="{BD060ADD-9EB9-963B-9F06-B5628061C38F}"/>
+              </a:ext>
+            </a:extLst>
+          </p:cNvPr>
+          <p:cNvPicPr>
+            <a:picLocks noChangeAspect="1"/>
+          </p:cNvPicPr>
+          <p:nvPr/>
+        </p:nvPicPr>
+        <p:blipFill>
+          <a:blip r:embed="rId2">
+            <a:extLst>
+              <a:ext uri="{28A0092B-C50C-407E-A947-70E740481C1C}">
+                <a14:useLocalDpi xmlns:a14="http://schemas.microsoft.com/office/drawing/2010/main" val="0"/>
+              </a:ext>
+            </a:extLst>
+          </a:blip>
+          <a:srcRect l="11942" r="9095" b="28090"/>
+          <a:stretch/>
+        </p:blipFill>
+        <p:spPr>
+          <a:xfrm>
+            <a:off x="145775" y="4135349"/>
+            <a:ext cx="5873855" cy="2057400"/>
+          </a:xfrm>
+          <a:prstGeom prst="rect">
+            <a:avLst/>
+          </a:prstGeom>
+        </p:spPr>
+      </p:pic>
+      <p:pic>
+        <p:nvPicPr>
+          <p:cNvPr id="19" name="Picture 18" descr="A green and white table with text&#10;&#10;Description automatically generated">
+            <a:extLst>
+              <a:ext uri="{FF2B5EF4-FFF2-40B4-BE49-F238E27FC236}">
+                <a16:creationId xmlns:a16="http://schemas.microsoft.com/office/drawing/2014/main" id="{73EEB54B-909F-94E4-8FEC-3F7288F16C37}"/>
+              </a:ext>
+            </a:extLst>
+          </p:cNvPr>
+          <p:cNvPicPr>
+            <a:picLocks noChangeAspect="1"/>
+          </p:cNvPicPr>
+          <p:nvPr/>
+        </p:nvPicPr>
+        <p:blipFill>
+          <a:blip r:embed="rId3">
+            <a:extLst>
+              <a:ext uri="{28A0092B-C50C-407E-A947-70E740481C1C}">
+                <a14:useLocalDpi xmlns:a14="http://schemas.microsoft.com/office/drawing/2010/main" val="0"/>
+              </a:ext>
+            </a:extLst>
+          </a:blip>
+          <a:srcRect l="11942" r="9095" b="28090"/>
+          <a:stretch/>
+        </p:blipFill>
+        <p:spPr>
+          <a:xfrm>
+            <a:off x="145774" y="1371600"/>
+            <a:ext cx="5873855" cy="2057400"/>
+          </a:xfrm>
+          <a:prstGeom prst="rect">
+            <a:avLst/>
+          </a:prstGeom>
+        </p:spPr>
+      </p:pic>
+      <p:pic>
+        <p:nvPicPr>
+          <p:cNvPr id="21" name="Picture 20" descr="A green and white table with text&#10;&#10;Description automatically generated">
+            <a:extLst>
+              <a:ext uri="{FF2B5EF4-FFF2-40B4-BE49-F238E27FC236}">
+                <a16:creationId xmlns:a16="http://schemas.microsoft.com/office/drawing/2014/main" id="{0FDBAD83-53FD-866D-485E-DA68D919DFDA}"/>
+              </a:ext>
+            </a:extLst>
+          </p:cNvPr>
+          <p:cNvPicPr>
+            <a:picLocks noChangeAspect="1"/>
+          </p:cNvPicPr>
+          <p:nvPr/>
+        </p:nvPicPr>
+        <p:blipFill>
+          <a:blip r:embed="rId4">
+            <a:extLst>
+              <a:ext uri="{28A0092B-C50C-407E-A947-70E740481C1C}">
+                <a14:useLocalDpi xmlns:a14="http://schemas.microsoft.com/office/drawing/2010/main" val="0"/>
+              </a:ext>
+            </a:extLst>
+          </a:blip>
+          <a:srcRect l="11553" r="9484" b="28090"/>
+          <a:stretch/>
+        </p:blipFill>
+        <p:spPr>
+          <a:xfrm>
+            <a:off x="6172370" y="1371600"/>
+            <a:ext cx="5873855" cy="2057400"/>
+          </a:xfrm>
+          <a:prstGeom prst="rect">
+            <a:avLst/>
+          </a:prstGeom>
+        </p:spPr>
+      </p:pic>
+      <p:pic>
+        <p:nvPicPr>
+          <p:cNvPr id="23" name="Picture 22" descr="A green and white table with text&#10;&#10;Description automatically generated">
+            <a:extLst>
+              <a:ext uri="{FF2B5EF4-FFF2-40B4-BE49-F238E27FC236}">
+                <a16:creationId xmlns:a16="http://schemas.microsoft.com/office/drawing/2014/main" id="{369B839F-4E53-062E-49DA-2D32E8EFDA70}"/>
+              </a:ext>
+            </a:extLst>
+          </p:cNvPr>
+          <p:cNvPicPr>
+            <a:picLocks noChangeAspect="1"/>
+          </p:cNvPicPr>
+          <p:nvPr/>
+        </p:nvPicPr>
+        <p:blipFill>
+          <a:blip r:embed="rId5">
+            <a:extLst>
+              <a:ext uri="{28A0092B-C50C-407E-A947-70E740481C1C}">
+                <a14:useLocalDpi xmlns:a14="http://schemas.microsoft.com/office/drawing/2010/main" val="0"/>
+              </a:ext>
+            </a:extLst>
+          </a:blip>
+          <a:srcRect l="12047" r="8990" b="28090"/>
+          <a:stretch/>
+        </p:blipFill>
+        <p:spPr>
+          <a:xfrm>
+            <a:off x="6172370" y="4135349"/>
+            <a:ext cx="5873856" cy="2057400"/>
+          </a:xfrm>
+          <a:prstGeom prst="rect">
+            <a:avLst/>
+          </a:prstGeom>
+        </p:spPr>
+      </p:pic>
+    </p:spTree>
+    <p:extLst>
+      <p:ext uri="{BB962C8B-B14F-4D97-AF65-F5344CB8AC3E}">
+        <p14:creationId xmlns:p14="http://schemas.microsoft.com/office/powerpoint/2010/main" val="3589008766"/>
+      </p:ext>
+    </p:extLst>
+  </p:cSld>
+  <p:clrMapOvr>
+    <a:masterClrMapping/>
+  </p:clrMapOvr>
+</p:sld>
+</file>
+
+<file path=ppt/slides/slide15.xml><?xml version="1.0" encoding="utf-8"?>
+<p:sld xmlns:a="http://schemas.openxmlformats.org/drawingml/2006/main" xmlns:r="http://schemas.openxmlformats.org/officeDocument/2006/relationships" xmlns:p="http://schemas.openxmlformats.org/presentationml/2006/main">
+  <p:cSld>
+    <p:spTree>
+      <p:nvGrpSpPr>
+        <p:cNvPr id="1" name=""/>
+        <p:cNvGrpSpPr/>
+        <p:nvPr/>
+      </p:nvGrpSpPr>
+      <p:grpSpPr>
+        <a:xfrm>
+          <a:off x="0" y="0"/>
+          <a:ext cx="0" cy="0"/>
+          <a:chOff x="0" y="0"/>
+          <a:chExt cx="0" cy="0"/>
+        </a:xfrm>
+      </p:grpSpPr>
+      <p:sp>
+        <p:nvSpPr>
+          <p:cNvPr id="2" name="Title 1">
+            <a:extLst>
+              <a:ext uri="{FF2B5EF4-FFF2-40B4-BE49-F238E27FC236}">
+                <a16:creationId xmlns:a16="http://schemas.microsoft.com/office/drawing/2014/main" id="{9645D4F8-093A-DB45-B629-006F175DBBCD}"/>
+              </a:ext>
+            </a:extLst>
+          </p:cNvPr>
+          <p:cNvSpPr>
+            <a:spLocks noGrp="1"/>
+          </p:cNvSpPr>
+          <p:nvPr>
+            <p:ph type="title"/>
+          </p:nvPr>
+        </p:nvSpPr>
+        <p:spPr/>
+        <p:txBody>
+          <a:bodyPr/>
+          <a:lstStyle/>
+          <a:p>
+            <a:r>
+              <a:rPr lang="en-US" dirty="0"/>
+              <a:t>Areas of Additional Study</a:t>
+            </a:r>
+          </a:p>
+        </p:txBody>
+      </p:sp>
+      <p:sp>
+        <p:nvSpPr>
+          <p:cNvPr id="3" name="Content Placeholder 2">
+            <a:extLst>
+              <a:ext uri="{FF2B5EF4-FFF2-40B4-BE49-F238E27FC236}">
+                <a16:creationId xmlns:a16="http://schemas.microsoft.com/office/drawing/2014/main" id="{1E9A0269-FDCC-8265-690E-D6CB87D37878}"/>
+              </a:ext>
+            </a:extLst>
+          </p:cNvPr>
+          <p:cNvSpPr>
+            <a:spLocks noGrp="1"/>
+          </p:cNvSpPr>
+          <p:nvPr>
+            <p:ph idx="1"/>
+          </p:nvPr>
+        </p:nvSpPr>
+        <p:spPr/>
+        <p:txBody>
+          <a:bodyPr>
+            <a:normAutofit lnSpcReduction="10000"/>
+          </a:bodyPr>
+          <a:lstStyle/>
+          <a:p>
+            <a:pPr>
+              <a:buFont typeface="+mj-lt"/>
+              <a:buAutoNum type="arabicPeriod"/>
+            </a:pPr>
+            <a:r>
+              <a:rPr lang="en-US" dirty="0"/>
+              <a:t>The proportions of conservation status between taxonomic categories and/or national parks</a:t>
+            </a:r>
+          </a:p>
+          <a:p>
+            <a:pPr lvl="1">
+              <a:buFont typeface="+mj-lt"/>
+              <a:buAutoNum type="arabicPeriod"/>
+            </a:pPr>
+            <a:r>
+              <a:rPr lang="en-US" dirty="0"/>
+              <a:t>If there is one category that has a greater proportion of severe conservation statuses, then this may be a potential investment; or, conversely, if one category has less then resources may be reallocated.</a:t>
+            </a:r>
+          </a:p>
+          <a:p>
+            <a:pPr>
+              <a:buFont typeface="+mj-lt"/>
+              <a:buAutoNum type="arabicPeriod"/>
+            </a:pPr>
+            <a:r>
+              <a:rPr lang="en-US" dirty="0"/>
+              <a:t>Total observations across taxonomic categories or national parks and how these sums relate to proportion of conservation status or Shannon index</a:t>
+            </a:r>
+          </a:p>
+          <a:p>
+            <a:pPr lvl="1">
+              <a:buFont typeface="+mj-lt"/>
+              <a:buAutoNum type="arabicPeriod"/>
+            </a:pPr>
+            <a:r>
+              <a:rPr lang="en-US" dirty="0"/>
+              <a:t>If species richness can have a significant impact on species diversity, then the procurement of a given species or the safeguard of a given species in each taxonomic category may prove more cost-effective.</a:t>
+            </a:r>
+          </a:p>
+          <a:p>
+            <a:pPr>
+              <a:buFont typeface="+mj-lt"/>
+              <a:buAutoNum type="arabicPeriod"/>
+            </a:pPr>
+            <a:r>
+              <a:rPr lang="en-US" dirty="0"/>
+              <a:t>Additional data: perhaps looking into maintenance costs over time could help determine a pattern and a point at which investment or outreach would be most efficient.</a:t>
+            </a:r>
+          </a:p>
+        </p:txBody>
+      </p:sp>
+    </p:spTree>
+    <p:extLst>
+      <p:ext uri="{BB962C8B-B14F-4D97-AF65-F5344CB8AC3E}">
+        <p14:creationId xmlns:p14="http://schemas.microsoft.com/office/powerpoint/2010/main" val="3101272637"/>
       </p:ext>
     </p:extLst>
   </p:cSld>
@@ -8573,7 +9235,7 @@
           <p:cNvPr id="2" name="Title 1">
             <a:extLst>
               <a:ext uri="{FF2B5EF4-FFF2-40B4-BE49-F238E27FC236}">
-                <a16:creationId xmlns:a16="http://schemas.microsoft.com/office/drawing/2014/main" id="{C65D610B-0772-AC82-1158-1623B66BC27F}"/>
+                <a16:creationId xmlns:a16="http://schemas.microsoft.com/office/drawing/2014/main" id="{489B43F2-265E-426C-FC6C-CB689360B9F0}"/>
               </a:ext>
             </a:extLst>
           </p:cNvPr>
@@ -8598,10 +9260,10 @@
       </p:sp>
       <p:sp>
         <p:nvSpPr>
-          <p:cNvPr id="4" name="Text Placeholder 3">
+          <p:cNvPr id="3" name="Content Placeholder 2">
             <a:extLst>
               <a:ext uri="{FF2B5EF4-FFF2-40B4-BE49-F238E27FC236}">
-                <a16:creationId xmlns:a16="http://schemas.microsoft.com/office/drawing/2014/main" id="{446615C9-C4E4-31F4-26E5-737FCB9567B8}"/>
+                <a16:creationId xmlns:a16="http://schemas.microsoft.com/office/drawing/2014/main" id="{7A7B827D-75C4-31AC-DF58-6C7B7F50A149}"/>
               </a:ext>
             </a:extLst>
           </p:cNvPr>
@@ -8609,17 +9271,24 @@
             <a:spLocks noGrp="1"/>
           </p:cNvSpPr>
           <p:nvPr>
-            <p:ph type="body" sz="half" idx="2"/>
-          </p:nvPr>
-        </p:nvSpPr>
-        <p:spPr/>
-        <p:txBody>
-          <a:bodyPr/>
+            <p:ph sz="half" idx="1"/>
+          </p:nvPr>
+        </p:nvSpPr>
+        <p:spPr>
+          <a:xfrm>
+            <a:off x="677334" y="2160589"/>
+            <a:ext cx="6041100" cy="3880772"/>
+          </a:xfrm>
+        </p:spPr>
+        <p:txBody>
+          <a:bodyPr>
+            <a:normAutofit fontScale="92500"/>
+          </a:bodyPr>
           <a:lstStyle/>
           <a:p>
             <a:r>
               <a:rPr lang="en-US" dirty="0"/>
-              <a:t>While the parks are diverse, the parks are not necessarily </a:t>
+              <a:t>The parks are fairly diverse as a whole, but the parks are not </a:t>
             </a:r>
             <a:r>
               <a:rPr lang="en-US" i="1" dirty="0"/>
@@ -8627,51 +9296,93 @@
             </a:r>
             <a:r>
               <a:rPr lang="en-US" dirty="0"/>
-              <a:t> diverse. </a:t>
+              <a:t> diverse</a:t>
             </a:r>
           </a:p>
           <a:p>
             <a:r>
               <a:rPr lang="en-US" dirty="0"/>
-              <a:t>What to </a:t>
-            </a:r>
-            <a:r>
-              <a:rPr lang="en-US" dirty="0" err="1"/>
-              <a:t>consid</a:t>
-            </a:r>
+              <a:t>Foci</a:t>
+            </a:r>
+          </a:p>
+          <a:p>
+            <a:pPr lvl="1"/>
+            <a:r>
+              <a:rPr lang="en-US" dirty="0"/>
+              <a:t>The data shows that Amphibian and Reptile species are the least diverse amongst the species represented in the sample</a:t>
+            </a:r>
+          </a:p>
+          <a:p>
+            <a:r>
+              <a:rPr lang="en-US" dirty="0"/>
+              <a:t>Additional</a:t>
+            </a:r>
+          </a:p>
+          <a:p>
+            <a:pPr lvl="1"/>
+            <a:r>
+              <a:rPr lang="en-US" dirty="0"/>
+              <a:t>When deciding resource allocation or expansion, keeping these species in mind could buttress an argument for expanding areas with compatible habitats</a:t>
+            </a:r>
+          </a:p>
+          <a:p>
+            <a:pPr lvl="1"/>
+            <a:r>
+              <a:rPr lang="en-US" dirty="0"/>
+              <a:t>With campaigning or public outreach, the Species dataset could provide insight as to which species in these taxonomic categories could be used in a visual piece</a:t>
+            </a:r>
+          </a:p>
+          <a:p>
+            <a:pPr lvl="1"/>
             <a:endParaRPr lang="en-US" dirty="0"/>
           </a:p>
         </p:txBody>
       </p:sp>
-      <p:sp>
-        <p:nvSpPr>
-          <p:cNvPr id="7" name="Content Placeholder 6">
+      <p:pic>
+        <p:nvPicPr>
+          <p:cNvPr id="5" name="Content Placeholder 10" descr="A comparison of a graph&#10;&#10;Description automatically generated with medium confidence">
             <a:extLst>
               <a:ext uri="{FF2B5EF4-FFF2-40B4-BE49-F238E27FC236}">
-                <a16:creationId xmlns:a16="http://schemas.microsoft.com/office/drawing/2014/main" id="{BCF62284-F14B-AE49-C879-FDECEAB09E46}"/>
+                <a16:creationId xmlns:a16="http://schemas.microsoft.com/office/drawing/2014/main" id="{4FA65DDA-8FE3-AEC8-CA19-439C4EDB5785}"/>
               </a:ext>
             </a:extLst>
           </p:cNvPr>
-          <p:cNvSpPr>
-            <a:spLocks noGrp="1"/>
-          </p:cNvSpPr>
-          <p:nvPr>
-            <p:ph idx="1"/>
-          </p:nvPr>
-        </p:nvSpPr>
-        <p:spPr/>
-        <p:txBody>
-          <a:bodyPr/>
-          <a:lstStyle/>
-          <a:p>
-            <a:endParaRPr lang="en-US"/>
-          </a:p>
-        </p:txBody>
-      </p:sp>
+          <p:cNvPicPr>
+            <a:picLocks noGrp="1" noChangeAspect="1"/>
+          </p:cNvPicPr>
+          <p:nvPr>
+            <p:ph sz="half" idx="2"/>
+          </p:nvPr>
+        </p:nvPicPr>
+        <p:blipFill>
+          <a:blip r:embed="rId2">
+            <a:extLst>
+              <a:ext uri="{28A0092B-C50C-407E-A947-70E740481C1C}">
+                <a14:useLocalDpi xmlns:a14="http://schemas.microsoft.com/office/drawing/2010/main" val="0"/>
+              </a:ext>
+            </a:extLst>
+          </a:blip>
+          <a:srcRect l="50012" t="7279" r="9446"/>
+          <a:stretch/>
+        </p:blipFill>
+        <p:spPr bwMode="auto">
+          <a:xfrm>
+            <a:off x="6952832" y="66029"/>
+            <a:ext cx="3529079" cy="6725942"/>
+          </a:xfrm>
+          <a:prstGeom prst="rect">
+            <a:avLst/>
+          </a:prstGeom>
+          <a:noFill/>
+          <a:ln>
+            <a:noFill/>
+          </a:ln>
+        </p:spPr>
+      </p:pic>
     </p:spTree>
     <p:extLst>
       <p:ext uri="{BB962C8B-B14F-4D97-AF65-F5344CB8AC3E}">
-        <p14:creationId xmlns:p14="http://schemas.microsoft.com/office/powerpoint/2010/main" val="2985598710"/>
+        <p14:creationId xmlns:p14="http://schemas.microsoft.com/office/powerpoint/2010/main" val="3054775918"/>
       </p:ext>
     </p:extLst>
   </p:cSld>

</xml_diff>